<commit_message>
starting to do some styling
</commit_message>
<xml_diff>
--- a/PFK2024.pptx
+++ b/PFK2024.pptx
@@ -6,21 +6,25 @@
   </p:sldMasterIdLst>
   <p:sldIdLst>
     <p:sldId id="256" r:id="rId2"/>
-    <p:sldId id="257" r:id="rId3"/>
-    <p:sldId id="268" r:id="rId4"/>
-    <p:sldId id="266" r:id="rId5"/>
-    <p:sldId id="267" r:id="rId6"/>
-    <p:sldId id="262" r:id="rId7"/>
-    <p:sldId id="258" r:id="rId8"/>
-    <p:sldId id="265" r:id="rId9"/>
-    <p:sldId id="259" r:id="rId10"/>
-    <p:sldId id="264" r:id="rId11"/>
-    <p:sldId id="269" r:id="rId12"/>
-    <p:sldId id="270" r:id="rId13"/>
-    <p:sldId id="271" r:id="rId14"/>
-    <p:sldId id="263" r:id="rId15"/>
-    <p:sldId id="260" r:id="rId16"/>
-    <p:sldId id="261" r:id="rId17"/>
+    <p:sldId id="268" r:id="rId3"/>
+    <p:sldId id="257" r:id="rId4"/>
+    <p:sldId id="274" r:id="rId5"/>
+    <p:sldId id="262" r:id="rId6"/>
+    <p:sldId id="266" r:id="rId7"/>
+    <p:sldId id="267" r:id="rId8"/>
+    <p:sldId id="258" r:id="rId9"/>
+    <p:sldId id="265" r:id="rId10"/>
+    <p:sldId id="259" r:id="rId11"/>
+    <p:sldId id="264" r:id="rId12"/>
+    <p:sldId id="272" r:id="rId13"/>
+    <p:sldId id="273" r:id="rId14"/>
+    <p:sldId id="269" r:id="rId15"/>
+    <p:sldId id="270" r:id="rId16"/>
+    <p:sldId id="271" r:id="rId17"/>
+    <p:sldId id="263" r:id="rId18"/>
+    <p:sldId id="260" r:id="rId19"/>
+    <p:sldId id="261" r:id="rId20"/>
+    <p:sldId id="275" r:id="rId21"/>
   </p:sldIdLst>
   <p:sldSz cx="12192000" cy="6858000"/>
   <p:notesSz cx="6858000" cy="9144000"/>
@@ -119,6 +123,11 @@
       </a:defRPr>
     </a:lvl9pPr>
   </p:defaultTextStyle>
+  <p:extLst>
+    <p:ext uri="{EFAFB233-063F-42B5-8137-9DF3F51BA10A}">
+      <p15:sldGuideLst xmlns:p15="http://schemas.microsoft.com/office/powerpoint/2012/main"/>
+    </p:ext>
+  </p:extLst>
 </p:presentation>
 </file>
 
@@ -271,7 +280,7 @@
           <a:p>
             <a:fld id="{A74D9E42-DAC6-024B-8498-2A799B5BD5AD}" type="datetimeFigureOut">
               <a:rPr lang="en-FI" smtClean="0"/>
-              <a:t>27.12.2023</a:t>
+              <a:t>17.1.2024</a:t>
             </a:fld>
             <a:endParaRPr lang="en-FI"/>
           </a:p>
@@ -471,7 +480,7 @@
           <a:p>
             <a:fld id="{A74D9E42-DAC6-024B-8498-2A799B5BD5AD}" type="datetimeFigureOut">
               <a:rPr lang="en-FI" smtClean="0"/>
-              <a:t>27.12.2023</a:t>
+              <a:t>17.1.2024</a:t>
             </a:fld>
             <a:endParaRPr lang="en-FI"/>
           </a:p>
@@ -681,7 +690,7 @@
           <a:p>
             <a:fld id="{A74D9E42-DAC6-024B-8498-2A799B5BD5AD}" type="datetimeFigureOut">
               <a:rPr lang="en-FI" smtClean="0"/>
-              <a:t>27.12.2023</a:t>
+              <a:t>17.1.2024</a:t>
             </a:fld>
             <a:endParaRPr lang="en-FI"/>
           </a:p>
@@ -881,7 +890,7 @@
           <a:p>
             <a:fld id="{A74D9E42-DAC6-024B-8498-2A799B5BD5AD}" type="datetimeFigureOut">
               <a:rPr lang="en-FI" smtClean="0"/>
-              <a:t>27.12.2023</a:t>
+              <a:t>17.1.2024</a:t>
             </a:fld>
             <a:endParaRPr lang="en-FI"/>
           </a:p>
@@ -1157,7 +1166,7 @@
           <a:p>
             <a:fld id="{A74D9E42-DAC6-024B-8498-2A799B5BD5AD}" type="datetimeFigureOut">
               <a:rPr lang="en-FI" smtClean="0"/>
-              <a:t>27.12.2023</a:t>
+              <a:t>17.1.2024</a:t>
             </a:fld>
             <a:endParaRPr lang="en-FI"/>
           </a:p>
@@ -1425,7 +1434,7 @@
           <a:p>
             <a:fld id="{A74D9E42-DAC6-024B-8498-2A799B5BD5AD}" type="datetimeFigureOut">
               <a:rPr lang="en-FI" smtClean="0"/>
-              <a:t>27.12.2023</a:t>
+              <a:t>17.1.2024</a:t>
             </a:fld>
             <a:endParaRPr lang="en-FI"/>
           </a:p>
@@ -1840,7 +1849,7 @@
           <a:p>
             <a:fld id="{A74D9E42-DAC6-024B-8498-2A799B5BD5AD}" type="datetimeFigureOut">
               <a:rPr lang="en-FI" smtClean="0"/>
-              <a:t>27.12.2023</a:t>
+              <a:t>17.1.2024</a:t>
             </a:fld>
             <a:endParaRPr lang="en-FI"/>
           </a:p>
@@ -1982,7 +1991,7 @@
           <a:p>
             <a:fld id="{A74D9E42-DAC6-024B-8498-2A799B5BD5AD}" type="datetimeFigureOut">
               <a:rPr lang="en-FI" smtClean="0"/>
-              <a:t>27.12.2023</a:t>
+              <a:t>17.1.2024</a:t>
             </a:fld>
             <a:endParaRPr lang="en-FI"/>
           </a:p>
@@ -2095,7 +2104,7 @@
           <a:p>
             <a:fld id="{A74D9E42-DAC6-024B-8498-2A799B5BD5AD}" type="datetimeFigureOut">
               <a:rPr lang="en-FI" smtClean="0"/>
-              <a:t>27.12.2023</a:t>
+              <a:t>17.1.2024</a:t>
             </a:fld>
             <a:endParaRPr lang="en-FI"/>
           </a:p>
@@ -2408,7 +2417,7 @@
           <a:p>
             <a:fld id="{A74D9E42-DAC6-024B-8498-2A799B5BD5AD}" type="datetimeFigureOut">
               <a:rPr lang="en-FI" smtClean="0"/>
-              <a:t>27.12.2023</a:t>
+              <a:t>17.1.2024</a:t>
             </a:fld>
             <a:endParaRPr lang="en-FI"/>
           </a:p>
@@ -2697,7 +2706,7 @@
           <a:p>
             <a:fld id="{A74D9E42-DAC6-024B-8498-2A799B5BD5AD}" type="datetimeFigureOut">
               <a:rPr lang="en-FI" smtClean="0"/>
-              <a:t>27.12.2023</a:t>
+              <a:t>17.1.2024</a:t>
             </a:fld>
             <a:endParaRPr lang="en-FI"/>
           </a:p>
@@ -2940,7 +2949,7 @@
           <a:p>
             <a:fld id="{A74D9E42-DAC6-024B-8498-2A799B5BD5AD}" type="datetimeFigureOut">
               <a:rPr lang="en-FI" smtClean="0"/>
-              <a:t>27.12.2023</a:t>
+              <a:t>17.1.2024</a:t>
             </a:fld>
             <a:endParaRPr lang="en-FI"/>
           </a:p>
@@ -3046,7 +3055,7 @@
             </a:extLst>
           </p:cNvPr>
           <p:cNvSpPr txBox="1"/>
-          <p:nvPr userDrawn="1">
+          <p:nvPr>
             <p:extLst>
               <p:ext uri="{1162E1C5-73C7-4A58-AE30-91384D911F3F}">
                 <p184:classification xmlns:p184="http://schemas.microsoft.com/office/powerpoint/2018/4/main" val="ftr"/>
@@ -3056,8 +3065,8 @@
         </p:nvSpPr>
         <p:spPr>
           <a:xfrm>
-            <a:off x="5698300" y="6672580"/>
-            <a:ext cx="817562" cy="121920"/>
+            <a:off x="5748338" y="6672580"/>
+            <a:ext cx="717550" cy="121920"/>
           </a:xfrm>
           <a:prstGeom prst="rect">
             <a:avLst/>
@@ -3073,12 +3082,12 @@
             <a:r>
               <a:rPr lang="en-FI" sz="800">
                 <a:solidFill>
-                  <a:srgbClr val="000000"/>
+                  <a:srgbClr val="737373"/>
                 </a:solidFill>
                 <a:latin typeface="Calibri" panose="020F0502020204030204" pitchFamily="34" charset="0"/>
                 <a:cs typeface="Calibri" panose="020F0502020204030204" pitchFamily="34" charset="0"/>
               </a:rPr>
-              <a:t>Sensitivity: Internal</a:t>
+              <a:t>Sensitivity: Open</a:t>
             </a:r>
           </a:p>
         </p:txBody>
@@ -3404,12 +3413,118 @@
           <a:chExt cx="0" cy="0"/>
         </a:xfrm>
       </p:grpSpPr>
+      <p:sp>
+        <p:nvSpPr>
+          <p:cNvPr id="2" name="Title 1">
+            <a:extLst>
+              <a:ext uri="{FF2B5EF4-FFF2-40B4-BE49-F238E27FC236}">
+                <a16:creationId xmlns:a16="http://schemas.microsoft.com/office/drawing/2014/main" id="{045396D2-41DC-8B8E-206D-AB53A78E3480}"/>
+              </a:ext>
+            </a:extLst>
+          </p:cNvPr>
+          <p:cNvSpPr>
+            <a:spLocks noGrp="1"/>
+          </p:cNvSpPr>
+          <p:nvPr>
+            <p:ph type="ctrTitle"/>
+          </p:nvPr>
+        </p:nvSpPr>
+        <p:spPr>
+          <a:xfrm>
+            <a:off x="1524000" y="868362"/>
+            <a:ext cx="9144000" cy="2387600"/>
+          </a:xfrm>
+        </p:spPr>
+        <p:txBody>
+          <a:bodyPr>
+            <a:normAutofit fontScale="90000"/>
+          </a:bodyPr>
+          <a:lstStyle/>
+          <a:p>
+            <a:r>
+              <a:rPr lang="en-FI" b="1" dirty="0">
+                <a:ln w="9525">
+                  <a:solidFill>
+                    <a:schemeClr val="bg1"/>
+                  </a:solidFill>
+                  <a:prstDash val="solid"/>
+                </a:ln>
+                <a:effectLst>
+                  <a:outerShdw blurRad="12700" dist="38100" dir="2700000" algn="tl" rotWithShape="0">
+                    <a:schemeClr val="bg1">
+                      <a:lumMod val="50000"/>
+                    </a:schemeClr>
+                  </a:outerShdw>
+                </a:effectLst>
+                <a:latin typeface="Fira Code" pitchFamily="49" charset="0"/>
+                <a:ea typeface="Fira Code" pitchFamily="49" charset="0"/>
+                <a:cs typeface="Fira Code" pitchFamily="49" charset="0"/>
+              </a:rPr>
+              <a:t>Polku Frontend-kehittäjäksi vuonna 2024</a:t>
+            </a:r>
+          </a:p>
+        </p:txBody>
+      </p:sp>
+      <p:sp>
+        <p:nvSpPr>
+          <p:cNvPr id="3" name="Subtitle 2">
+            <a:extLst>
+              <a:ext uri="{FF2B5EF4-FFF2-40B4-BE49-F238E27FC236}">
+                <a16:creationId xmlns:a16="http://schemas.microsoft.com/office/drawing/2014/main" id="{5788441A-6928-DCFA-4C44-D771291EFAA7}"/>
+              </a:ext>
+            </a:extLst>
+          </p:cNvPr>
+          <p:cNvSpPr>
+            <a:spLocks noGrp="1"/>
+          </p:cNvSpPr>
+          <p:nvPr>
+            <p:ph type="subTitle" idx="1"/>
+          </p:nvPr>
+        </p:nvSpPr>
+        <p:spPr/>
+        <p:txBody>
+          <a:bodyPr/>
+          <a:lstStyle/>
+          <a:p>
+            <a:r>
+              <a:rPr lang="en-FI" b="1" dirty="0">
+                <a:effectLst>
+                  <a:outerShdw blurRad="50800" dist="38100" dir="2700000" algn="tl" rotWithShape="0">
+                    <a:prstClr val="black">
+                      <a:alpha val="40000"/>
+                    </a:prstClr>
+                  </a:outerShdw>
+                </a:effectLst>
+                <a:latin typeface="Source Sans Pro" panose="020B0503030403020204" pitchFamily="34" charset="0"/>
+                <a:ea typeface="Source Sans Pro" panose="020B0503030403020204" pitchFamily="34" charset="0"/>
+              </a:rPr>
+              <a:t>Erkka Virtanen, DNA</a:t>
+            </a:r>
+          </a:p>
+          <a:p>
+            <a:r>
+              <a:rPr lang="en-FI" b="1" dirty="0">
+                <a:effectLst>
+                  <a:outerShdw blurRad="50800" dist="38100" dir="2700000" algn="tl" rotWithShape="0">
+                    <a:prstClr val="black">
+                      <a:alpha val="40000"/>
+                    </a:prstClr>
+                  </a:outerShdw>
+                </a:effectLst>
+                <a:latin typeface="Source Sans Pro" panose="020B0503030403020204" pitchFamily="34" charset="0"/>
+                <a:ea typeface="Source Sans Pro" panose="020B0503030403020204" pitchFamily="34" charset="0"/>
+              </a:rPr>
+              <a:t>9.2.2024</a:t>
+            </a:r>
+          </a:p>
+        </p:txBody>
+      </p:sp>
       <p:pic>
         <p:nvPicPr>
-          <p:cNvPr id="5" name="Picture 4" descr="A computer screen with colorful graphics&#10;&#10;Description automatically generated">
-            <a:extLst>
-              <a:ext uri="{FF2B5EF4-FFF2-40B4-BE49-F238E27FC236}">
-                <a16:creationId xmlns:a16="http://schemas.microsoft.com/office/drawing/2014/main" id="{68CC1818-78DD-B755-438C-126DAD4C47C0}"/>
+          <p:cNvPr id="4" name="Picture 3" descr="A pink background with black letters&#10;&#10;Description automatically generated">
+            <a:extLst>
+              <a:ext uri="{FF2B5EF4-FFF2-40B4-BE49-F238E27FC236}">
+                <a16:creationId xmlns:a16="http://schemas.microsoft.com/office/drawing/2014/main" id="{9B839DEF-F468-C820-48DF-879511828098}"/>
               </a:ext>
             </a:extLst>
           </p:cNvPr>
@@ -3426,66 +3541,92 @@
         </p:blipFill>
         <p:spPr>
           <a:xfrm>
-            <a:off x="-119745" y="-21773"/>
-            <a:ext cx="6901545" cy="6901545"/>
+            <a:off x="6770466" y="5009857"/>
+            <a:ext cx="1315830" cy="1315830"/>
           </a:xfrm>
           <a:prstGeom prst="rect">
             <a:avLst/>
           </a:prstGeom>
         </p:spPr>
       </p:pic>
-      <p:sp>
-        <p:nvSpPr>
-          <p:cNvPr id="2" name="Title 1">
-            <a:extLst>
-              <a:ext uri="{FF2B5EF4-FFF2-40B4-BE49-F238E27FC236}">
-                <a16:creationId xmlns:a16="http://schemas.microsoft.com/office/drawing/2014/main" id="{045396D2-41DC-8B8E-206D-AB53A78E3480}"/>
-              </a:ext>
-            </a:extLst>
-          </p:cNvPr>
-          <p:cNvSpPr>
-            <a:spLocks noGrp="1"/>
-          </p:cNvSpPr>
-          <p:nvPr>
-            <p:ph type="ctrTitle"/>
-          </p:nvPr>
-        </p:nvSpPr>
-        <p:spPr/>
-        <p:txBody>
-          <a:bodyPr/>
-          <a:lstStyle/>
-          <a:p>
-            <a:r>
-              <a:rPr lang="en-FI" dirty="0"/>
-              <a:t>Polku Frontend-kehittäjäksi vuonna 2024</a:t>
-            </a:r>
-          </a:p>
-        </p:txBody>
-      </p:sp>
-      <p:sp>
-        <p:nvSpPr>
-          <p:cNvPr id="3" name="Subtitle 2">
-            <a:extLst>
-              <a:ext uri="{FF2B5EF4-FFF2-40B4-BE49-F238E27FC236}">
-                <a16:creationId xmlns:a16="http://schemas.microsoft.com/office/drawing/2014/main" id="{5788441A-6928-DCFA-4C44-D771291EFAA7}"/>
-              </a:ext>
-            </a:extLst>
-          </p:cNvPr>
-          <p:cNvSpPr>
-            <a:spLocks noGrp="1"/>
-          </p:cNvSpPr>
-          <p:nvPr>
-            <p:ph type="subTitle" idx="1"/>
-          </p:nvPr>
-        </p:nvSpPr>
-        <p:spPr/>
-        <p:txBody>
-          <a:bodyPr/>
-          <a:lstStyle/>
-          <a:p>
-            <a:r>
-              <a:rPr lang="en-FI" dirty="0"/>
-              <a:t>Erkka Virtanen, DNA</a:t>
+      <p:pic>
+        <p:nvPicPr>
+          <p:cNvPr id="7" name="Picture 6" descr="A blue circle with black text&#10;&#10;Description automatically generated">
+            <a:extLst>
+              <a:ext uri="{FF2B5EF4-FFF2-40B4-BE49-F238E27FC236}">
+                <a16:creationId xmlns:a16="http://schemas.microsoft.com/office/drawing/2014/main" id="{C6977C01-5C91-8062-72AD-2163973D2BCE}"/>
+              </a:ext>
+            </a:extLst>
+          </p:cNvPr>
+          <p:cNvPicPr>
+            <a:picLocks noChangeAspect="1"/>
+          </p:cNvPicPr>
+          <p:nvPr/>
+        </p:nvPicPr>
+        <p:blipFill>
+          <a:blip r:embed="rId3"/>
+          <a:stretch>
+            <a:fillRect/>
+          </a:stretch>
+        </p:blipFill>
+        <p:spPr>
+          <a:xfrm>
+            <a:off x="4188763" y="4994031"/>
+            <a:ext cx="1315830" cy="1315830"/>
+          </a:xfrm>
+          <a:prstGeom prst="rect">
+            <a:avLst/>
+          </a:prstGeom>
+        </p:spPr>
+      </p:pic>
+      <p:sp>
+        <p:nvSpPr>
+          <p:cNvPr id="9" name="TextBox 8">
+            <a:extLst>
+              <a:ext uri="{FF2B5EF4-FFF2-40B4-BE49-F238E27FC236}">
+                <a16:creationId xmlns:a16="http://schemas.microsoft.com/office/drawing/2014/main" id="{1B93B8D1-8B8A-F80A-D20A-70413551A8A7}"/>
+              </a:ext>
+            </a:extLst>
+          </p:cNvPr>
+          <p:cNvSpPr txBox="1"/>
+          <p:nvPr/>
+        </p:nvSpPr>
+        <p:spPr>
+          <a:xfrm>
+            <a:off x="5832100" y="5277776"/>
+            <a:ext cx="527800" cy="779992"/>
+          </a:xfrm>
+          <a:prstGeom prst="rect">
+            <a:avLst/>
+          </a:prstGeom>
+          <a:noFill/>
+        </p:spPr>
+        <p:txBody>
+          <a:bodyPr wrap="square" rtlCol="0">
+            <a:spAutoFit/>
+          </a:bodyPr>
+          <a:lstStyle/>
+          <a:p>
+            <a:r>
+              <a:rPr lang="en-FI" sz="4400" b="1" dirty="0">
+                <a:ln w="9525">
+                  <a:solidFill>
+                    <a:schemeClr val="bg1"/>
+                  </a:solidFill>
+                  <a:prstDash val="solid"/>
+                </a:ln>
+                <a:effectLst>
+                  <a:outerShdw blurRad="12700" dist="38100" dir="2700000" algn="tl" rotWithShape="0">
+                    <a:schemeClr val="bg1">
+                      <a:lumMod val="50000"/>
+                    </a:schemeClr>
+                  </a:outerShdw>
+                </a:effectLst>
+                <a:latin typeface="Fira Code" pitchFamily="49" charset="0"/>
+                <a:ea typeface="Fira Code" pitchFamily="49" charset="0"/>
+                <a:cs typeface="Fira Code" pitchFamily="49" charset="0"/>
+              </a:rPr>
+              <a:t>X</a:t>
             </a:r>
           </a:p>
         </p:txBody>
@@ -3543,7 +3684,7 @@
           <a:p>
             <a:r>
               <a:rPr lang="en-FI" dirty="0"/>
-              <a:t>Työkalut</a:t>
+              <a:t>Miten päästä alkuun?</a:t>
             </a:r>
           </a:p>
         </p:txBody>
@@ -3571,122 +3712,15 @@
           <a:p>
             <a:r>
               <a:rPr lang="en-FI" dirty="0"/>
-              <a:t>Tietokone M</a:t>
-            </a:r>
-            <a:r>
-              <a:rPr lang="en-GB" dirty="0"/>
-              <a:t>a</a:t>
-            </a:r>
-            <a:r>
-              <a:rPr lang="en-FI" dirty="0"/>
-              <a:t>c (Windows tai Linux)</a:t>
-            </a:r>
-          </a:p>
-          <a:p>
-            <a:r>
-              <a:rPr lang="en-FI" dirty="0"/>
-              <a:t>Tekstieditori VSCode (</a:t>
-            </a:r>
-            <a:r>
-              <a:rPr lang="en-GB" dirty="0"/>
-              <a:t>https://</a:t>
-            </a:r>
-            <a:r>
-              <a:rPr lang="en-GB" dirty="0" err="1"/>
-              <a:t>code.visualstudio.com</a:t>
-            </a:r>
-            <a:r>
-              <a:rPr lang="en-GB" dirty="0"/>
-              <a:t>/</a:t>
-            </a:r>
-            <a:r>
-              <a:rPr lang="en-FI" dirty="0"/>
-              <a:t>) Atom, Sublime, WebStorm,</a:t>
-            </a:r>
-          </a:p>
-          <a:p>
-            <a:r>
-              <a:rPr lang="en-FI" dirty="0"/>
-              <a:t>Selain Chrome(</a:t>
-            </a:r>
-            <a:r>
-              <a:rPr lang="en-GB" dirty="0"/>
-              <a:t>https://</a:t>
-            </a:r>
-            <a:r>
-              <a:rPr lang="en-GB" dirty="0" err="1"/>
-              <a:t>www.google.com</a:t>
-            </a:r>
-            <a:r>
-              <a:rPr lang="en-GB" dirty="0"/>
-              <a:t>/chrome/</a:t>
-            </a:r>
-            <a:r>
-              <a:rPr lang="en-FI" dirty="0"/>
-              <a:t>),(FireFox, Safari)</a:t>
-            </a:r>
-          </a:p>
-          <a:p>
-            <a:r>
-              <a:rPr lang="en-FI" dirty="0"/>
-              <a:t>Node Js (</a:t>
-            </a:r>
-            <a:r>
-              <a:rPr lang="en-GB" dirty="0">
-                <a:hlinkClick r:id="rId2"/>
-              </a:rPr>
-              <a:t>https://nodejs.org/en</a:t>
-            </a:r>
-            <a:r>
-              <a:rPr lang="en-GB" dirty="0"/>
-              <a:t>, LTS-</a:t>
-            </a:r>
-            <a:r>
-              <a:rPr lang="en-GB" dirty="0" err="1"/>
-              <a:t>versio</a:t>
-            </a:r>
-            <a:r>
-              <a:rPr lang="en-FI" dirty="0"/>
-              <a:t>)</a:t>
-            </a:r>
-          </a:p>
-          <a:p>
-            <a:r>
-              <a:rPr lang="en-FI" dirty="0"/>
-              <a:t>Terminaali, valmiiksi asennettu (iterm2)</a:t>
-            </a:r>
-          </a:p>
-          <a:p>
-            <a:r>
-              <a:rPr lang="en-FI" dirty="0"/>
-              <a:t>Git versionhallinta (windowsille </a:t>
-            </a:r>
-            <a:r>
-              <a:rPr lang="en-GB" dirty="0"/>
-              <a:t>https://git-</a:t>
-            </a:r>
-            <a:r>
-              <a:rPr lang="en-GB" dirty="0" err="1"/>
-              <a:t>scm.com</a:t>
-            </a:r>
-            <a:r>
-              <a:rPr lang="en-GB" dirty="0"/>
-              <a:t>/download/win</a:t>
-            </a:r>
-            <a:r>
-              <a:rPr lang="en-FI" dirty="0"/>
-              <a:t>)</a:t>
-            </a:r>
-          </a:p>
-          <a:p>
-            <a:endParaRPr lang="en-FI" dirty="0"/>
+              <a:t>Tässä lista konkreettisista minimiasioista, jotka tarvitset alkuun pääsemiseen. Ei huolta, niistä kaikki ovat ilmaisia!</a:t>
+            </a:r>
           </a:p>
         </p:txBody>
       </p:sp>
     </p:spTree>
     <p:extLst>
       <p:ext uri="{BB962C8B-B14F-4D97-AF65-F5344CB8AC3E}">
-        <p14:creationId xmlns:p14="http://schemas.microsoft.com/office/powerpoint/2010/main" val="4227872243"/>
+        <p14:creationId xmlns:p14="http://schemas.microsoft.com/office/powerpoint/2010/main" val="2492267038"/>
       </p:ext>
     </p:extLst>
   </p:cSld>
@@ -3736,7 +3770,7 @@
           <a:p>
             <a:r>
               <a:rPr lang="en-FI" dirty="0"/>
-              <a:t>Mistä hakea tietoa?</a:t>
+              <a:t>Työkalut</a:t>
             </a:r>
           </a:p>
         </p:txBody>
@@ -3759,81 +3793,116 @@
         </p:nvSpPr>
         <p:spPr/>
         <p:txBody>
-          <a:bodyPr>
-            <a:normAutofit/>
-          </a:bodyPr>
-          <a:lstStyle/>
-          <a:p>
-            <a:r>
-              <a:rPr lang="fi-FI" dirty="0"/>
-              <a:t>MDN (</a:t>
-            </a:r>
-            <a:r>
-              <a:rPr lang="fi-FI" dirty="0" err="1"/>
-              <a:t>https</a:t>
-            </a:r>
-            <a:r>
-              <a:rPr lang="fi-FI" dirty="0"/>
-              <a:t>://</a:t>
-            </a:r>
-            <a:r>
-              <a:rPr lang="fi-FI" dirty="0" err="1"/>
-              <a:t>developer.mozilla.org</a:t>
-            </a:r>
-            <a:r>
-              <a:rPr lang="fi-FI" dirty="0"/>
-              <a:t>/en-US/) </a:t>
-            </a:r>
-          </a:p>
-          <a:p>
+          <a:bodyPr/>
+          <a:lstStyle/>
+          <a:p>
+            <a:r>
+              <a:rPr lang="en-FI" dirty="0"/>
+              <a:t>Tietokone M</a:t>
+            </a:r>
             <a:r>
               <a:rPr lang="en-GB" dirty="0"/>
-              <a:t>Stack Overflow (</a:t>
+              <a:t>a</a:t>
+            </a:r>
+            <a:r>
+              <a:rPr lang="en-FI" dirty="0"/>
+              <a:t>c (Windows tai Linux)</a:t>
+            </a:r>
+          </a:p>
+          <a:p>
+            <a:r>
+              <a:rPr lang="en-FI" dirty="0"/>
+              <a:t>Tekstieditori VSCode (</a:t>
+            </a:r>
+            <a:r>
+              <a:rPr lang="en-GB" dirty="0"/>
+              <a:t>https://</a:t>
+            </a:r>
+            <a:r>
+              <a:rPr lang="en-GB" dirty="0" err="1"/>
+              <a:t>code.visualstudio.com</a:t>
+            </a:r>
+            <a:r>
+              <a:rPr lang="en-GB" dirty="0"/>
+              <a:t>/</a:t>
+            </a:r>
+            <a:r>
+              <a:rPr lang="en-FI" dirty="0"/>
+              <a:t>) Atom, Sublime, WebStorm,</a:t>
+            </a:r>
+          </a:p>
+          <a:p>
+            <a:r>
+              <a:rPr lang="en-FI" dirty="0"/>
+              <a:t>Selain Chrome(</a:t>
+            </a:r>
+            <a:r>
+              <a:rPr lang="en-GB" dirty="0"/>
+              <a:t>https://</a:t>
+            </a:r>
+            <a:r>
+              <a:rPr lang="en-GB" dirty="0" err="1"/>
+              <a:t>www.google.com</a:t>
+            </a:r>
+            <a:r>
+              <a:rPr lang="en-GB" dirty="0"/>
+              <a:t>/chrome/</a:t>
+            </a:r>
+            <a:r>
+              <a:rPr lang="en-FI" dirty="0"/>
+              <a:t>),(FireFox, Safari)</a:t>
+            </a:r>
+          </a:p>
+          <a:p>
+            <a:r>
+              <a:rPr lang="en-FI" dirty="0"/>
+              <a:t>Node Js (</a:t>
             </a:r>
             <a:r>
               <a:rPr lang="en-GB" dirty="0">
                 <a:hlinkClick r:id="rId2"/>
               </a:rPr>
-              <a:t>https://stackoverflow.com/</a:t>
+              <a:t>https://nodejs.org/en</a:t>
             </a:r>
             <a:r>
               <a:rPr lang="en-GB" dirty="0"/>
+              <a:t>, LTS-</a:t>
+            </a:r>
+            <a:r>
+              <a:rPr lang="en-GB" dirty="0" err="1"/>
+              <a:t>versio</a:t>
+            </a:r>
+            <a:r>
+              <a:rPr lang="en-FI" dirty="0"/>
               <a:t>)</a:t>
             </a:r>
-            <a:endParaRPr lang="fi-FI" dirty="0"/>
-          </a:p>
-          <a:p>
-            <a:r>
-              <a:rPr lang="fi-FI" dirty="0" err="1"/>
-              <a:t>ChatGPT</a:t>
-            </a:r>
-            <a:r>
-              <a:rPr lang="fi-FI" dirty="0"/>
-              <a:t> (</a:t>
-            </a:r>
-            <a:r>
-              <a:rPr lang="fi-FI" dirty="0">
-                <a:hlinkClick r:id="rId3"/>
-              </a:rPr>
-              <a:t>https://chat.openai.com/</a:t>
-            </a:r>
-            <a:r>
-              <a:rPr lang="fi-FI" dirty="0"/>
-              <a:t>, vaatii rekisteröitymisen)</a:t>
-            </a:r>
-          </a:p>
-          <a:p>
-            <a:r>
-              <a:rPr lang="fi-FI" dirty="0"/>
-              <a:t>Foorumit, </a:t>
-            </a:r>
-            <a:r>
-              <a:rPr lang="fi-FI" dirty="0" err="1"/>
-              <a:t>Discord</a:t>
-            </a:r>
-            <a:r>
-              <a:rPr lang="fi-FI" dirty="0"/>
-              <a:t>…</a:t>
+          </a:p>
+          <a:p>
+            <a:r>
+              <a:rPr lang="en-FI" dirty="0"/>
+              <a:t>Terminaali, valmiiksi asennettu (iterm2)</a:t>
+            </a:r>
+          </a:p>
+          <a:p>
+            <a:r>
+              <a:rPr lang="en-FI" dirty="0"/>
+              <a:t>Git versionhallinta (windowsille </a:t>
+            </a:r>
+            <a:r>
+              <a:rPr lang="en-GB" dirty="0"/>
+              <a:t>https://git-</a:t>
+            </a:r>
+            <a:r>
+              <a:rPr lang="en-GB" dirty="0" err="1"/>
+              <a:t>scm.com</a:t>
+            </a:r>
+            <a:r>
+              <a:rPr lang="en-GB" dirty="0"/>
+              <a:t>/download/win</a:t>
+            </a:r>
+            <a:r>
+              <a:rPr lang="en-FI" dirty="0"/>
+              <a:t>)</a:t>
             </a:r>
           </a:p>
           <a:p>
@@ -3844,7 +3913,7 @@
     </p:spTree>
     <p:extLst>
       <p:ext uri="{BB962C8B-B14F-4D97-AF65-F5344CB8AC3E}">
-        <p14:creationId xmlns:p14="http://schemas.microsoft.com/office/powerpoint/2010/main" val="2225094470"/>
+        <p14:creationId xmlns:p14="http://schemas.microsoft.com/office/powerpoint/2010/main" val="4227872243"/>
       </p:ext>
     </p:extLst>
   </p:cSld>
@@ -3894,7 +3963,7 @@
           <a:p>
             <a:r>
               <a:rPr lang="en-FI" dirty="0"/>
-              <a:t>Miten pysyä aallon harjalla?</a:t>
+              <a:t>Kielet</a:t>
             </a:r>
           </a:p>
         </p:txBody>
@@ -3921,12 +3990,69 @@
           <a:lstStyle/>
           <a:p>
             <a:r>
+              <a:rPr lang="fi-FI" dirty="0"/>
+              <a:t>HTML</a:t>
+            </a:r>
+          </a:p>
+          <a:p>
+            <a:r>
+              <a:rPr lang="fi-FI" dirty="0"/>
+              <a:t>CSS</a:t>
+            </a:r>
+          </a:p>
+          <a:p>
+            <a:r>
+              <a:rPr lang="fi-FI" dirty="0"/>
+              <a:t>JavaScript (</a:t>
+            </a:r>
+            <a:r>
               <a:rPr lang="fi-FI" dirty="0" err="1"/>
-              <a:t>HackerNews</a:t>
-            </a:r>
-            <a:endParaRPr lang="en-FI" dirty="0"/>
-          </a:p>
-          <a:p>
+              <a:t>TypeScript</a:t>
+            </a:r>
+            <a:r>
+              <a:rPr lang="fi-FI" dirty="0"/>
+              <a:t>) (</a:t>
+            </a:r>
+            <a:r>
+              <a:rPr lang="fi-FI" dirty="0" err="1"/>
+              <a:t>EcmaScript</a:t>
+            </a:r>
+            <a:r>
+              <a:rPr lang="fi-FI" dirty="0"/>
+              <a:t>)</a:t>
+            </a:r>
+          </a:p>
+          <a:p>
+            <a:r>
+              <a:rPr lang="fi-FI" dirty="0" err="1"/>
+              <a:t>Php</a:t>
+            </a:r>
+            <a:endParaRPr lang="fi-FI" dirty="0"/>
+          </a:p>
+          <a:p>
+            <a:r>
+              <a:rPr lang="fi-FI" dirty="0"/>
+              <a:t>Python</a:t>
+            </a:r>
+          </a:p>
+          <a:p>
+            <a:r>
+              <a:rPr lang="fi-FI" dirty="0" err="1"/>
+              <a:t>Bash</a:t>
+            </a:r>
+            <a:endParaRPr lang="fi-FI" dirty="0"/>
+          </a:p>
+          <a:p>
+            <a:r>
+              <a:rPr lang="fi-FI" dirty="0" err="1"/>
+              <a:t>Ruby</a:t>
+            </a:r>
+            <a:endParaRPr lang="fi-FI" dirty="0"/>
+          </a:p>
+          <a:p>
+            <a:pPr marL="0" indent="0">
+              <a:buNone/>
+            </a:pPr>
             <a:endParaRPr lang="en-FI" dirty="0"/>
           </a:p>
         </p:txBody>
@@ -3934,7 +4060,7 @@
     </p:spTree>
     <p:extLst>
       <p:ext uri="{BB962C8B-B14F-4D97-AF65-F5344CB8AC3E}">
-        <p14:creationId xmlns:p14="http://schemas.microsoft.com/office/powerpoint/2010/main" val="3559929563"/>
+        <p14:creationId xmlns:p14="http://schemas.microsoft.com/office/powerpoint/2010/main" val="1342760168"/>
       </p:ext>
     </p:extLst>
   </p:cSld>
@@ -3984,7 +4110,7 @@
           <a:p>
             <a:r>
               <a:rPr lang="en-FI" dirty="0"/>
-              <a:t>Millaista se työ sitten oikeasti on?</a:t>
+              <a:t>Teknologiat</a:t>
             </a:r>
           </a:p>
         </p:txBody>
@@ -4007,88 +4133,33 @@
         </p:nvSpPr>
         <p:spPr/>
         <p:txBody>
-          <a:bodyPr>
-            <a:normAutofit/>
-          </a:bodyPr>
+          <a:bodyPr/>
           <a:lstStyle/>
           <a:p>
             <a:r>
               <a:rPr lang="fi-FI" dirty="0"/>
-              <a:t>Ketterä kehitys (Agile </a:t>
-            </a:r>
+              <a:t>JSON</a:t>
+            </a:r>
+          </a:p>
+          <a:p>
+            <a:r>
+              <a:rPr lang="fi-FI" dirty="0"/>
+              <a:t>API</a:t>
+            </a:r>
+          </a:p>
+          <a:p>
             <a:r>
               <a:rPr lang="fi-FI" dirty="0" err="1"/>
-              <a:t>development</a:t>
-            </a:r>
-            <a:r>
-              <a:rPr lang="fi-FI" dirty="0"/>
-              <a:t>)</a:t>
-            </a:r>
-          </a:p>
-          <a:p>
-            <a:r>
-              <a:rPr lang="fi-FI" dirty="0"/>
-              <a:t>2 viikon sprintit</a:t>
-            </a:r>
-          </a:p>
-          <a:p>
-            <a:r>
-              <a:rPr lang="fi-FI" dirty="0"/>
-              <a:t>Demot</a:t>
-            </a:r>
-          </a:p>
-          <a:p>
-            <a:r>
-              <a:rPr lang="fi-FI" dirty="0" err="1"/>
-              <a:t>Dailyt</a:t>
+              <a:t>Git</a:t>
             </a:r>
             <a:endParaRPr lang="fi-FI" dirty="0"/>
-          </a:p>
-          <a:p>
-            <a:r>
-              <a:rPr lang="fi-FI" dirty="0" err="1"/>
-              <a:t>Refinementit</a:t>
-            </a:r>
-            <a:r>
-              <a:rPr lang="fi-FI" dirty="0"/>
-              <a:t>, Retrot ja muut palaverit</a:t>
-            </a:r>
-          </a:p>
-          <a:p>
-            <a:r>
-              <a:rPr lang="fi-FI" dirty="0"/>
-              <a:t>Koodausta</a:t>
-            </a:r>
-          </a:p>
-          <a:p>
-            <a:r>
-              <a:rPr lang="fi-FI" dirty="0"/>
-              <a:t>Hyvin paljon yhteistyötä! (Soft </a:t>
-            </a:r>
-            <a:r>
-              <a:rPr lang="fi-FI" dirty="0" err="1"/>
-              <a:t>skills</a:t>
-            </a:r>
-            <a:r>
-              <a:rPr lang="fi-FI" dirty="0"/>
-              <a:t>)</a:t>
-            </a:r>
-          </a:p>
-          <a:p>
-            <a:pPr marL="0" indent="0">
-              <a:buNone/>
-            </a:pPr>
-            <a:endParaRPr lang="fi-FI" dirty="0"/>
-          </a:p>
-          <a:p>
-            <a:endParaRPr lang="en-FI" dirty="0"/>
           </a:p>
         </p:txBody>
       </p:sp>
     </p:spTree>
     <p:extLst>
       <p:ext uri="{BB962C8B-B14F-4D97-AF65-F5344CB8AC3E}">
-        <p14:creationId xmlns:p14="http://schemas.microsoft.com/office/powerpoint/2010/main" val="28855136"/>
+        <p14:creationId xmlns:p14="http://schemas.microsoft.com/office/powerpoint/2010/main" val="3527618082"/>
       </p:ext>
     </p:extLst>
   </p:cSld>
@@ -4138,7 +4209,7 @@
           <a:p>
             <a:r>
               <a:rPr lang="en-FI" dirty="0"/>
-              <a:t>Ensimmäistä työpaikkaa varten</a:t>
+              <a:t>Mistä hakea tietoa?</a:t>
             </a:r>
           </a:p>
         </p:txBody>
@@ -4161,38 +4232,92 @@
         </p:nvSpPr>
         <p:spPr/>
         <p:txBody>
-          <a:bodyPr/>
-          <a:lstStyle/>
-          <a:p>
-            <a:r>
-              <a:rPr lang="en-FI" dirty="0"/>
-              <a:t>Paljon hakijoita, miten erottua joukosta?</a:t>
-            </a:r>
-          </a:p>
-          <a:p>
-            <a:r>
-              <a:rPr lang="en-FI" dirty="0"/>
-              <a:t>Github profiili!!! (omat projektit)</a:t>
-            </a:r>
-          </a:p>
-          <a:p>
-            <a:r>
-              <a:rPr lang="en-FI" dirty="0"/>
-              <a:t>LinkedIn profiili!</a:t>
-            </a:r>
-          </a:p>
-          <a:p>
-            <a:r>
-              <a:rPr lang="en-FI" dirty="0"/>
-              <a:t>työharjoittelut</a:t>
-            </a:r>
+          <a:bodyPr>
+            <a:normAutofit/>
+          </a:bodyPr>
+          <a:lstStyle/>
+          <a:p>
+            <a:r>
+              <a:rPr lang="fi-FI" dirty="0"/>
+              <a:t>MDN (</a:t>
+            </a:r>
+            <a:r>
+              <a:rPr lang="fi-FI" dirty="0" err="1"/>
+              <a:t>https</a:t>
+            </a:r>
+            <a:r>
+              <a:rPr lang="fi-FI" dirty="0"/>
+              <a:t>://</a:t>
+            </a:r>
+            <a:r>
+              <a:rPr lang="fi-FI" dirty="0" err="1"/>
+              <a:t>developer.mozilla.org</a:t>
+            </a:r>
+            <a:r>
+              <a:rPr lang="fi-FI" dirty="0"/>
+              <a:t>/en-US/) </a:t>
+            </a:r>
+          </a:p>
+          <a:p>
+            <a:r>
+              <a:rPr lang="en-GB" dirty="0"/>
+              <a:t>Stack Overflow (</a:t>
+            </a:r>
+            <a:r>
+              <a:rPr lang="en-GB" dirty="0">
+                <a:hlinkClick r:id="rId2"/>
+              </a:rPr>
+              <a:t>https://stackoverflow.com/</a:t>
+            </a:r>
+            <a:r>
+              <a:rPr lang="en-GB" dirty="0"/>
+              <a:t>)</a:t>
+            </a:r>
+            <a:endParaRPr lang="fi-FI" dirty="0"/>
+          </a:p>
+          <a:p>
+            <a:r>
+              <a:rPr lang="fi-FI" dirty="0" err="1"/>
+              <a:t>ChatGPT</a:t>
+            </a:r>
+            <a:r>
+              <a:rPr lang="fi-FI" dirty="0"/>
+              <a:t> (</a:t>
+            </a:r>
+            <a:r>
+              <a:rPr lang="fi-FI" dirty="0">
+                <a:hlinkClick r:id="rId3"/>
+              </a:rPr>
+              <a:t>https://chat.openai.com/</a:t>
+            </a:r>
+            <a:r>
+              <a:rPr lang="fi-FI" dirty="0"/>
+              <a:t>, vaatii rekisteröitymisen)</a:t>
+            </a:r>
+          </a:p>
+          <a:p>
+            <a:r>
+              <a:rPr lang="fi-FI" dirty="0"/>
+              <a:t>Foorumit, </a:t>
+            </a:r>
+            <a:r>
+              <a:rPr lang="fi-FI" dirty="0" err="1"/>
+              <a:t>Discord</a:t>
+            </a:r>
+            <a:r>
+              <a:rPr lang="fi-FI" dirty="0"/>
+              <a:t>…</a:t>
+            </a:r>
+          </a:p>
+          <a:p>
+            <a:endParaRPr lang="en-FI" dirty="0"/>
           </a:p>
         </p:txBody>
       </p:sp>
     </p:spTree>
     <p:extLst>
       <p:ext uri="{BB962C8B-B14F-4D97-AF65-F5344CB8AC3E}">
-        <p14:creationId xmlns:p14="http://schemas.microsoft.com/office/powerpoint/2010/main" val="2929153574"/>
+        <p14:creationId xmlns:p14="http://schemas.microsoft.com/office/powerpoint/2010/main" val="2225094470"/>
       </p:ext>
     </p:extLst>
   </p:cSld>
@@ -4224,7 +4349,7 @@
           <p:cNvPr id="2" name="Title 1">
             <a:extLst>
               <a:ext uri="{FF2B5EF4-FFF2-40B4-BE49-F238E27FC236}">
-                <a16:creationId xmlns:a16="http://schemas.microsoft.com/office/drawing/2014/main" id="{196358E5-BF87-C876-AD03-A2BF064DF52C}"/>
+                <a16:creationId xmlns:a16="http://schemas.microsoft.com/office/drawing/2014/main" id="{F101F404-C1E5-9324-2496-125A7F944312}"/>
               </a:ext>
             </a:extLst>
           </p:cNvPr>
@@ -4242,7 +4367,7 @@
           <a:p>
             <a:r>
               <a:rPr lang="en-FI" dirty="0"/>
-              <a:t>Sanasto</a:t>
+              <a:t>Miten pysyä aallon harjalla?</a:t>
             </a:r>
           </a:p>
         </p:txBody>
@@ -4252,7 +4377,7 @@
           <p:cNvPr id="3" name="Content Placeholder 2">
             <a:extLst>
               <a:ext uri="{FF2B5EF4-FFF2-40B4-BE49-F238E27FC236}">
-                <a16:creationId xmlns:a16="http://schemas.microsoft.com/office/drawing/2014/main" id="{5878C58C-642F-8E1D-3BC8-D4890AE14FF7}"/>
+                <a16:creationId xmlns:a16="http://schemas.microsoft.com/office/drawing/2014/main" id="{1AFC09FA-74AD-CF75-26D6-5841407E8C3F}"/>
               </a:ext>
             </a:extLst>
           </p:cNvPr>
@@ -4269,22 +4394,33 @@
           <a:lstStyle/>
           <a:p>
             <a:r>
-              <a:rPr lang="en-FI" dirty="0"/>
-              <a:t>Git – maailman suosituin versionhallintaohjelma</a:t>
-            </a:r>
-          </a:p>
-          <a:p>
-            <a:r>
-              <a:rPr lang="en-FI" dirty="0"/>
-              <a:t>VsCode – suosittu ilmainen tekstieditori</a:t>
-            </a:r>
+              <a:rPr lang="fi-FI" dirty="0" err="1"/>
+              <a:t>HackerNews</a:t>
+            </a:r>
+            <a:endParaRPr lang="fi-FI" dirty="0"/>
+          </a:p>
+          <a:p>
+            <a:r>
+              <a:rPr lang="fi-FI" dirty="0"/>
+              <a:t>Kollegat</a:t>
+            </a:r>
+          </a:p>
+          <a:p>
+            <a:r>
+              <a:rPr lang="fi-FI" dirty="0"/>
+              <a:t>Yleinen kiinnostuneisuus</a:t>
+            </a:r>
+            <a:endParaRPr lang="en-FI" dirty="0"/>
+          </a:p>
+          <a:p>
+            <a:endParaRPr lang="en-FI" dirty="0"/>
           </a:p>
         </p:txBody>
       </p:sp>
     </p:spTree>
     <p:extLst>
       <p:ext uri="{BB962C8B-B14F-4D97-AF65-F5344CB8AC3E}">
-        <p14:creationId xmlns:p14="http://schemas.microsoft.com/office/powerpoint/2010/main" val="216353024"/>
+        <p14:creationId xmlns:p14="http://schemas.microsoft.com/office/powerpoint/2010/main" val="3559929563"/>
       </p:ext>
     </p:extLst>
   </p:cSld>
@@ -4316,6 +4452,356 @@
           <p:cNvPr id="2" name="Title 1">
             <a:extLst>
               <a:ext uri="{FF2B5EF4-FFF2-40B4-BE49-F238E27FC236}">
+                <a16:creationId xmlns:a16="http://schemas.microsoft.com/office/drawing/2014/main" id="{F101F404-C1E5-9324-2496-125A7F944312}"/>
+              </a:ext>
+            </a:extLst>
+          </p:cNvPr>
+          <p:cNvSpPr>
+            <a:spLocks noGrp="1"/>
+          </p:cNvSpPr>
+          <p:nvPr>
+            <p:ph type="title"/>
+          </p:nvPr>
+        </p:nvSpPr>
+        <p:spPr/>
+        <p:txBody>
+          <a:bodyPr/>
+          <a:lstStyle/>
+          <a:p>
+            <a:r>
+              <a:rPr lang="en-FI" dirty="0"/>
+              <a:t>Millaista se työ sitten oikeasti on?</a:t>
+            </a:r>
+          </a:p>
+        </p:txBody>
+      </p:sp>
+      <p:sp>
+        <p:nvSpPr>
+          <p:cNvPr id="3" name="Content Placeholder 2">
+            <a:extLst>
+              <a:ext uri="{FF2B5EF4-FFF2-40B4-BE49-F238E27FC236}">
+                <a16:creationId xmlns:a16="http://schemas.microsoft.com/office/drawing/2014/main" id="{1AFC09FA-74AD-CF75-26D6-5841407E8C3F}"/>
+              </a:ext>
+            </a:extLst>
+          </p:cNvPr>
+          <p:cNvSpPr>
+            <a:spLocks noGrp="1"/>
+          </p:cNvSpPr>
+          <p:nvPr>
+            <p:ph idx="1"/>
+          </p:nvPr>
+        </p:nvSpPr>
+        <p:spPr/>
+        <p:txBody>
+          <a:bodyPr>
+            <a:normAutofit/>
+          </a:bodyPr>
+          <a:lstStyle/>
+          <a:p>
+            <a:r>
+              <a:rPr lang="fi-FI" dirty="0"/>
+              <a:t>Ketterä kehitys (Agile </a:t>
+            </a:r>
+            <a:r>
+              <a:rPr lang="fi-FI" dirty="0" err="1"/>
+              <a:t>development</a:t>
+            </a:r>
+            <a:r>
+              <a:rPr lang="fi-FI" dirty="0"/>
+              <a:t>)</a:t>
+            </a:r>
+          </a:p>
+          <a:p>
+            <a:r>
+              <a:rPr lang="fi-FI" dirty="0"/>
+              <a:t>2 viikon sprintit</a:t>
+            </a:r>
+          </a:p>
+          <a:p>
+            <a:r>
+              <a:rPr lang="fi-FI" dirty="0"/>
+              <a:t>Demot</a:t>
+            </a:r>
+          </a:p>
+          <a:p>
+            <a:r>
+              <a:rPr lang="fi-FI" dirty="0" err="1"/>
+              <a:t>Dailyt</a:t>
+            </a:r>
+            <a:endParaRPr lang="fi-FI" dirty="0"/>
+          </a:p>
+          <a:p>
+            <a:r>
+              <a:rPr lang="fi-FI" dirty="0" err="1"/>
+              <a:t>Refinementit</a:t>
+            </a:r>
+            <a:r>
+              <a:rPr lang="fi-FI" dirty="0"/>
+              <a:t>, Retrot ja muut palaverit</a:t>
+            </a:r>
+          </a:p>
+          <a:p>
+            <a:r>
+              <a:rPr lang="fi-FI" dirty="0"/>
+              <a:t>Koodausta</a:t>
+            </a:r>
+          </a:p>
+          <a:p>
+            <a:r>
+              <a:rPr lang="fi-FI" dirty="0"/>
+              <a:t>Hyvin paljon yhteistyötä! (Soft </a:t>
+            </a:r>
+            <a:r>
+              <a:rPr lang="fi-FI" dirty="0" err="1"/>
+              <a:t>skills</a:t>
+            </a:r>
+            <a:r>
+              <a:rPr lang="fi-FI" dirty="0"/>
+              <a:t>)</a:t>
+            </a:r>
+          </a:p>
+          <a:p>
+            <a:pPr marL="0" indent="0">
+              <a:buNone/>
+            </a:pPr>
+            <a:endParaRPr lang="fi-FI" dirty="0"/>
+          </a:p>
+          <a:p>
+            <a:endParaRPr lang="en-FI" dirty="0"/>
+          </a:p>
+        </p:txBody>
+      </p:sp>
+    </p:spTree>
+    <p:extLst>
+      <p:ext uri="{BB962C8B-B14F-4D97-AF65-F5344CB8AC3E}">
+        <p14:creationId xmlns:p14="http://schemas.microsoft.com/office/powerpoint/2010/main" val="28855136"/>
+      </p:ext>
+    </p:extLst>
+  </p:cSld>
+  <p:clrMapOvr>
+    <a:masterClrMapping/>
+  </p:clrMapOvr>
+</p:sld>
+</file>
+
+<file path=ppt/slides/slide17.xml><?xml version="1.0" encoding="utf-8"?>
+<p:sld xmlns:a="http://schemas.openxmlformats.org/drawingml/2006/main" xmlns:r="http://schemas.openxmlformats.org/officeDocument/2006/relationships" xmlns:p="http://schemas.openxmlformats.org/presentationml/2006/main">
+  <p:cSld>
+    <p:spTree>
+      <p:nvGrpSpPr>
+        <p:cNvPr id="1" name=""/>
+        <p:cNvGrpSpPr/>
+        <p:nvPr/>
+      </p:nvGrpSpPr>
+      <p:grpSpPr>
+        <a:xfrm>
+          <a:off x="0" y="0"/>
+          <a:ext cx="0" cy="0"/>
+          <a:chOff x="0" y="0"/>
+          <a:chExt cx="0" cy="0"/>
+        </a:xfrm>
+      </p:grpSpPr>
+      <p:sp>
+        <p:nvSpPr>
+          <p:cNvPr id="2" name="Title 1">
+            <a:extLst>
+              <a:ext uri="{FF2B5EF4-FFF2-40B4-BE49-F238E27FC236}">
+                <a16:creationId xmlns:a16="http://schemas.microsoft.com/office/drawing/2014/main" id="{F101F404-C1E5-9324-2496-125A7F944312}"/>
+              </a:ext>
+            </a:extLst>
+          </p:cNvPr>
+          <p:cNvSpPr>
+            <a:spLocks noGrp="1"/>
+          </p:cNvSpPr>
+          <p:nvPr>
+            <p:ph type="title"/>
+          </p:nvPr>
+        </p:nvSpPr>
+        <p:spPr/>
+        <p:txBody>
+          <a:bodyPr/>
+          <a:lstStyle/>
+          <a:p>
+            <a:r>
+              <a:rPr lang="en-FI" dirty="0"/>
+              <a:t>Ensimmäistä työpaikkaa varten</a:t>
+            </a:r>
+          </a:p>
+        </p:txBody>
+      </p:sp>
+      <p:sp>
+        <p:nvSpPr>
+          <p:cNvPr id="3" name="Content Placeholder 2">
+            <a:extLst>
+              <a:ext uri="{FF2B5EF4-FFF2-40B4-BE49-F238E27FC236}">
+                <a16:creationId xmlns:a16="http://schemas.microsoft.com/office/drawing/2014/main" id="{1AFC09FA-74AD-CF75-26D6-5841407E8C3F}"/>
+              </a:ext>
+            </a:extLst>
+          </p:cNvPr>
+          <p:cNvSpPr>
+            <a:spLocks noGrp="1"/>
+          </p:cNvSpPr>
+          <p:nvPr>
+            <p:ph idx="1"/>
+          </p:nvPr>
+        </p:nvSpPr>
+        <p:spPr/>
+        <p:txBody>
+          <a:bodyPr/>
+          <a:lstStyle/>
+          <a:p>
+            <a:r>
+              <a:rPr lang="en-FI" dirty="0"/>
+              <a:t>Paljon hakijoita, miten erottua joukosta?</a:t>
+            </a:r>
+          </a:p>
+          <a:p>
+            <a:r>
+              <a:rPr lang="en-FI" dirty="0"/>
+              <a:t>Github profiili!!! (omat projektit)</a:t>
+            </a:r>
+          </a:p>
+          <a:p>
+            <a:r>
+              <a:rPr lang="en-FI" dirty="0"/>
+              <a:t>LinkedIn profiili!</a:t>
+            </a:r>
+          </a:p>
+          <a:p>
+            <a:r>
+              <a:rPr lang="en-FI" dirty="0"/>
+              <a:t>työharjoittelut</a:t>
+            </a:r>
+          </a:p>
+        </p:txBody>
+      </p:sp>
+    </p:spTree>
+    <p:extLst>
+      <p:ext uri="{BB962C8B-B14F-4D97-AF65-F5344CB8AC3E}">
+        <p14:creationId xmlns:p14="http://schemas.microsoft.com/office/powerpoint/2010/main" val="2929153574"/>
+      </p:ext>
+    </p:extLst>
+  </p:cSld>
+  <p:clrMapOvr>
+    <a:masterClrMapping/>
+  </p:clrMapOvr>
+</p:sld>
+</file>
+
+<file path=ppt/slides/slide18.xml><?xml version="1.0" encoding="utf-8"?>
+<p:sld xmlns:a="http://schemas.openxmlformats.org/drawingml/2006/main" xmlns:r="http://schemas.openxmlformats.org/officeDocument/2006/relationships" xmlns:p="http://schemas.openxmlformats.org/presentationml/2006/main">
+  <p:cSld>
+    <p:spTree>
+      <p:nvGrpSpPr>
+        <p:cNvPr id="1" name=""/>
+        <p:cNvGrpSpPr/>
+        <p:nvPr/>
+      </p:nvGrpSpPr>
+      <p:grpSpPr>
+        <a:xfrm>
+          <a:off x="0" y="0"/>
+          <a:ext cx="0" cy="0"/>
+          <a:chOff x="0" y="0"/>
+          <a:chExt cx="0" cy="0"/>
+        </a:xfrm>
+      </p:grpSpPr>
+      <p:sp>
+        <p:nvSpPr>
+          <p:cNvPr id="2" name="Title 1">
+            <a:extLst>
+              <a:ext uri="{FF2B5EF4-FFF2-40B4-BE49-F238E27FC236}">
+                <a16:creationId xmlns:a16="http://schemas.microsoft.com/office/drawing/2014/main" id="{196358E5-BF87-C876-AD03-A2BF064DF52C}"/>
+              </a:ext>
+            </a:extLst>
+          </p:cNvPr>
+          <p:cNvSpPr>
+            <a:spLocks noGrp="1"/>
+          </p:cNvSpPr>
+          <p:nvPr>
+            <p:ph type="title"/>
+          </p:nvPr>
+        </p:nvSpPr>
+        <p:spPr/>
+        <p:txBody>
+          <a:bodyPr/>
+          <a:lstStyle/>
+          <a:p>
+            <a:r>
+              <a:rPr lang="en-FI" dirty="0"/>
+              <a:t>Sanasto</a:t>
+            </a:r>
+          </a:p>
+        </p:txBody>
+      </p:sp>
+      <p:sp>
+        <p:nvSpPr>
+          <p:cNvPr id="3" name="Content Placeholder 2">
+            <a:extLst>
+              <a:ext uri="{FF2B5EF4-FFF2-40B4-BE49-F238E27FC236}">
+                <a16:creationId xmlns:a16="http://schemas.microsoft.com/office/drawing/2014/main" id="{5878C58C-642F-8E1D-3BC8-D4890AE14FF7}"/>
+              </a:ext>
+            </a:extLst>
+          </p:cNvPr>
+          <p:cNvSpPr>
+            <a:spLocks noGrp="1"/>
+          </p:cNvSpPr>
+          <p:nvPr>
+            <p:ph idx="1"/>
+          </p:nvPr>
+        </p:nvSpPr>
+        <p:spPr/>
+        <p:txBody>
+          <a:bodyPr/>
+          <a:lstStyle/>
+          <a:p>
+            <a:r>
+              <a:rPr lang="en-FI" dirty="0"/>
+              <a:t>Git – maailman suosituin versionhallintaohjelma</a:t>
+            </a:r>
+          </a:p>
+          <a:p>
+            <a:r>
+              <a:rPr lang="en-FI" dirty="0"/>
+              <a:t>VsCode – suosittu ilmainen tekstieditori</a:t>
+            </a:r>
+          </a:p>
+        </p:txBody>
+      </p:sp>
+    </p:spTree>
+    <p:extLst>
+      <p:ext uri="{BB962C8B-B14F-4D97-AF65-F5344CB8AC3E}">
+        <p14:creationId xmlns:p14="http://schemas.microsoft.com/office/powerpoint/2010/main" val="216353024"/>
+      </p:ext>
+    </p:extLst>
+  </p:cSld>
+  <p:clrMapOvr>
+    <a:masterClrMapping/>
+  </p:clrMapOvr>
+</p:sld>
+</file>
+
+<file path=ppt/slides/slide19.xml><?xml version="1.0" encoding="utf-8"?>
+<p:sld xmlns:a="http://schemas.openxmlformats.org/drawingml/2006/main" xmlns:r="http://schemas.openxmlformats.org/officeDocument/2006/relationships" xmlns:p="http://schemas.openxmlformats.org/presentationml/2006/main">
+  <p:cSld>
+    <p:spTree>
+      <p:nvGrpSpPr>
+        <p:cNvPr id="1" name=""/>
+        <p:cNvGrpSpPr/>
+        <p:nvPr/>
+      </p:nvGrpSpPr>
+      <p:grpSpPr>
+        <a:xfrm>
+          <a:off x="0" y="0"/>
+          <a:ext cx="0" cy="0"/>
+          <a:chOff x="0" y="0"/>
+          <a:chExt cx="0" cy="0"/>
+        </a:xfrm>
+      </p:grpSpPr>
+      <p:sp>
+        <p:nvSpPr>
+          <p:cNvPr id="2" name="Title 1">
+            <a:extLst>
+              <a:ext uri="{FF2B5EF4-FFF2-40B4-BE49-F238E27FC236}">
                 <a16:creationId xmlns:a16="http://schemas.microsoft.com/office/drawing/2014/main" id="{EC51A716-0B11-91F1-641B-A5F54559DF9D}"/>
               </a:ext>
             </a:extLst>
@@ -4380,6 +4866,46 @@
 <file path=ppt/slides/slide2.xml><?xml version="1.0" encoding="utf-8"?>
 <p:sld xmlns:a="http://schemas.openxmlformats.org/drawingml/2006/main" xmlns:r="http://schemas.openxmlformats.org/officeDocument/2006/relationships" xmlns:p="http://schemas.openxmlformats.org/presentationml/2006/main">
   <p:cSld>
+    <p:bg>
+      <p:bgPr>
+        <a:gradFill flip="none" rotWithShape="1">
+          <a:gsLst>
+            <a:gs pos="9000">
+              <a:srgbClr val="FFD7A5"/>
+            </a:gs>
+            <a:gs pos="0">
+              <a:srgbClr val="FFAEAD"/>
+            </a:gs>
+            <a:gs pos="22000">
+              <a:srgbClr val="FDFFB6"/>
+            </a:gs>
+            <a:gs pos="33000">
+              <a:srgbClr val="CBFFC0"/>
+            </a:gs>
+            <a:gs pos="63000">
+              <a:srgbClr val="A0C4FF"/>
+            </a:gs>
+            <a:gs pos="97000">
+              <a:srgbClr val="FFFFFC"/>
+            </a:gs>
+            <a:gs pos="87000">
+              <a:srgbClr val="FFC6FF"/>
+            </a:gs>
+            <a:gs pos="76000">
+              <a:srgbClr val="BDB2FF"/>
+            </a:gs>
+            <a:gs pos="48000">
+              <a:srgbClr val="9BF7FF"/>
+            </a:gs>
+          </a:gsLst>
+          <a:path path="circle">
+            <a:fillToRect l="100000" t="100000"/>
+          </a:path>
+          <a:tileRect r="-100000" b="-100000"/>
+        </a:gradFill>
+        <a:effectLst/>
+      </p:bgPr>
+    </p:bg>
     <p:spTree>
       <p:nvGrpSpPr>
         <p:cNvPr id="1" name=""/>
@@ -4412,12 +4938,37 @@
         </p:nvSpPr>
         <p:spPr/>
         <p:txBody>
-          <a:bodyPr/>
-          <a:lstStyle/>
-          <a:p>
-            <a:r>
-              <a:rPr lang="en-FI" dirty="0"/>
-              <a:t>Lyhyt esittelyt kuka minä olen</a:t>
+          <a:bodyPr>
+            <a:scene3d>
+              <a:camera prst="orthographicFront"/>
+              <a:lightRig rig="soft" dir="t">
+                <a:rot lat="0" lon="0" rev="15600000"/>
+              </a:lightRig>
+            </a:scene3d>
+            <a:sp3d prstMaterial="softEdge"/>
+          </a:bodyPr>
+          <a:lstStyle/>
+          <a:p>
+            <a:r>
+              <a:rPr lang="en-FI" b="1" dirty="0">
+                <a:ln w="9525">
+                  <a:solidFill>
+                    <a:schemeClr val="bg1"/>
+                  </a:solidFill>
+                  <a:prstDash val="solid"/>
+                </a:ln>
+                <a:effectLst>
+                  <a:outerShdw blurRad="12700" dist="38100" dir="2700000" algn="tl" rotWithShape="0">
+                    <a:schemeClr val="bg1">
+                      <a:lumMod val="50000"/>
+                    </a:schemeClr>
+                  </a:outerShdw>
+                </a:effectLst>
+                <a:latin typeface="Fira Code" pitchFamily="49" charset="0"/>
+                <a:ea typeface="Fira Code" pitchFamily="49" charset="0"/>
+                <a:cs typeface="Fira Code" pitchFamily="49" charset="0"/>
+              </a:rPr>
+              <a:t>Kenelle tämä on tarkoitettu?</a:t>
             </a:r>
           </a:p>
         </p:txBody>
@@ -4444,16 +4995,75 @@
           <a:lstStyle/>
           <a:p>
             <a:r>
-              <a:rPr lang="en-FI" dirty="0"/>
-              <a:t>DNA:lla töissä frontend-devaajana</a:t>
-            </a:r>
-          </a:p>
-        </p:txBody>
-      </p:sp>
+              <a:rPr lang="en-FI" dirty="0">
+                <a:ln w="0"/>
+                <a:effectLst>
+                  <a:glow rad="38100">
+                    <a:schemeClr val="bg1">
+                      <a:lumMod val="75000"/>
+                      <a:alpha val="40000"/>
+                    </a:schemeClr>
+                  </a:glow>
+                  <a:outerShdw blurRad="50800" dist="63500" dir="2700000" algn="tl" rotWithShape="0">
+                    <a:schemeClr val="bg1">
+                      <a:lumMod val="75000"/>
+                      <a:alpha val="40000"/>
+                    </a:schemeClr>
+                  </a:outerShdw>
+                </a:effectLst>
+                <a:latin typeface="Source Sans Pro" panose="020B0503030403020204" pitchFamily="34" charset="0"/>
+                <a:ea typeface="Source Sans Pro" panose="020B0503030403020204" pitchFamily="34" charset="0"/>
+                <a:cs typeface="Fira Code" pitchFamily="49" charset="0"/>
+              </a:rPr>
+              <a:t>Kaikille, jotka ovat kiinnostuneita saamaan konkreettisia työkaluja ensimmäistä junior frontend-devaajan työpaikkaa varten</a:t>
+            </a:r>
+          </a:p>
+        </p:txBody>
+      </p:sp>
+      <p:pic>
+        <p:nvPicPr>
+          <p:cNvPr id="4" name="Picture 3">
+            <a:extLst>
+              <a:ext uri="{FF2B5EF4-FFF2-40B4-BE49-F238E27FC236}">
+                <a16:creationId xmlns:a16="http://schemas.microsoft.com/office/drawing/2014/main" id="{048F2614-90E7-308D-127D-6CDD6FC71CE0}"/>
+              </a:ext>
+            </a:extLst>
+          </p:cNvPr>
+          <p:cNvPicPr>
+            <a:picLocks noChangeAspect="1"/>
+          </p:cNvPicPr>
+          <p:nvPr/>
+        </p:nvPicPr>
+        <p:blipFill>
+          <a:blip r:embed="rId2"/>
+          <a:stretch>
+            <a:fillRect/>
+          </a:stretch>
+        </p:blipFill>
+        <p:spPr>
+          <a:xfrm>
+            <a:off x="7968242" y="3107317"/>
+            <a:ext cx="3385558" cy="3385558"/>
+          </a:xfrm>
+          <a:prstGeom prst="rect">
+            <a:avLst/>
+          </a:prstGeom>
+          <a:effectLst>
+            <a:softEdge rad="12700"/>
+          </a:effectLst>
+          <a:scene3d>
+            <a:camera prst="orthographicFront"/>
+            <a:lightRig rig="threePt" dir="t"/>
+          </a:scene3d>
+          <a:sp3d>
+            <a:bevelT/>
+          </a:sp3d>
+        </p:spPr>
+      </p:pic>
     </p:spTree>
     <p:extLst>
       <p:ext uri="{BB962C8B-B14F-4D97-AF65-F5344CB8AC3E}">
-        <p14:creationId xmlns:p14="http://schemas.microsoft.com/office/powerpoint/2010/main" val="919774687"/>
+        <p14:creationId xmlns:p14="http://schemas.microsoft.com/office/powerpoint/2010/main" val="2512536616"/>
       </p:ext>
     </p:extLst>
   </p:cSld>
@@ -4463,7 +5073,7 @@
 </p:sld>
 </file>
 
-<file path=ppt/slides/slide3.xml><?xml version="1.0" encoding="utf-8"?>
+<file path=ppt/slides/slide20.xml><?xml version="1.0" encoding="utf-8"?>
 <p:sld xmlns:a="http://schemas.openxmlformats.org/drawingml/2006/main" xmlns:r="http://schemas.openxmlformats.org/officeDocument/2006/relationships" xmlns:p="http://schemas.openxmlformats.org/presentationml/2006/main">
   <p:cSld>
     <p:spTree>
@@ -4485,7 +5095,7 @@
           <p:cNvPr id="2" name="Title 1">
             <a:extLst>
               <a:ext uri="{FF2B5EF4-FFF2-40B4-BE49-F238E27FC236}">
-                <a16:creationId xmlns:a16="http://schemas.microsoft.com/office/drawing/2014/main" id="{3A694B04-800D-90AF-F9C5-BA2682774786}"/>
+                <a16:creationId xmlns:a16="http://schemas.microsoft.com/office/drawing/2014/main" id="{EC51A716-0B11-91F1-641B-A5F54559DF9D}"/>
               </a:ext>
             </a:extLst>
           </p:cNvPr>
@@ -4503,7 +5113,7 @@
           <a:p>
             <a:r>
               <a:rPr lang="en-FI" dirty="0"/>
-              <a:t>Kenelle?</a:t>
+              <a:t>Lähteet</a:t>
             </a:r>
           </a:p>
         </p:txBody>
@@ -4513,7 +5123,7 @@
           <p:cNvPr id="3" name="Content Placeholder 2">
             <a:extLst>
               <a:ext uri="{FF2B5EF4-FFF2-40B4-BE49-F238E27FC236}">
-                <a16:creationId xmlns:a16="http://schemas.microsoft.com/office/drawing/2014/main" id="{B1AA3757-FFFA-98A4-3AC9-A249A9058FA9}"/>
+                <a16:creationId xmlns:a16="http://schemas.microsoft.com/office/drawing/2014/main" id="{359D0D94-B33D-0666-25FE-75548F4407D9}"/>
               </a:ext>
             </a:extLst>
           </p:cNvPr>
@@ -4529,17 +5139,14 @@
           <a:bodyPr/>
           <a:lstStyle/>
           <a:p>
-            <a:r>
-              <a:rPr lang="en-FI" dirty="0"/>
-              <a:t>Kaikille, jotka ovat kiinnostuneita saamaan konkreettisia työkaluja ensimmäisen junior frontend-devaajan työpaikkaa varten.</a:t>
-            </a:r>
+            <a:endParaRPr lang="en-FI"/>
           </a:p>
         </p:txBody>
       </p:sp>
     </p:spTree>
     <p:extLst>
       <p:ext uri="{BB962C8B-B14F-4D97-AF65-F5344CB8AC3E}">
-        <p14:creationId xmlns:p14="http://schemas.microsoft.com/office/powerpoint/2010/main" val="2512536616"/>
+        <p14:creationId xmlns:p14="http://schemas.microsoft.com/office/powerpoint/2010/main" val="3182809699"/>
       </p:ext>
     </p:extLst>
   </p:cSld>
@@ -4549,9 +5156,42 @@
 </p:sld>
 </file>
 
-<file path=ppt/slides/slide4.xml><?xml version="1.0" encoding="utf-8"?>
+<file path=ppt/slides/slide3.xml><?xml version="1.0" encoding="utf-8"?>
 <p:sld xmlns:a="http://schemas.openxmlformats.org/drawingml/2006/main" xmlns:r="http://schemas.openxmlformats.org/officeDocument/2006/relationships" xmlns:p="http://schemas.openxmlformats.org/presentationml/2006/main">
   <p:cSld>
+    <p:bg>
+      <p:bgPr>
+        <a:gradFill flip="none" rotWithShape="1">
+          <a:gsLst>
+            <a:gs pos="7000">
+              <a:srgbClr val="FFD7A5"/>
+            </a:gs>
+            <a:gs pos="0">
+              <a:srgbClr val="FFAEAD"/>
+            </a:gs>
+            <a:gs pos="15000">
+              <a:srgbClr val="FDFFB6"/>
+            </a:gs>
+            <a:gs pos="24000">
+              <a:srgbClr val="CBFFC0"/>
+            </a:gs>
+            <a:gs pos="78000">
+              <a:schemeClr val="bg1">
+                <a:lumMod val="95000"/>
+              </a:schemeClr>
+            </a:gs>
+            <a:gs pos="30000">
+              <a:srgbClr val="9BF7FF"/>
+            </a:gs>
+          </a:gsLst>
+          <a:path path="circle">
+            <a:fillToRect l="100000" t="100000"/>
+          </a:path>
+          <a:tileRect r="-100000" b="-100000"/>
+        </a:gradFill>
+        <a:effectLst/>
+      </p:bgPr>
+    </p:bg>
     <p:spTree>
       <p:nvGrpSpPr>
         <p:cNvPr id="1" name=""/>
@@ -4588,8 +5228,25 @@
           <a:lstStyle/>
           <a:p>
             <a:r>
-              <a:rPr lang="en-FI" dirty="0"/>
-              <a:t>Frontend, backend?</a:t>
+              <a:rPr lang="en-FI" b="1" dirty="0">
+                <a:ln w="9525">
+                  <a:solidFill>
+                    <a:schemeClr val="bg1"/>
+                  </a:solidFill>
+                  <a:prstDash val="solid"/>
+                </a:ln>
+                <a:effectLst>
+                  <a:outerShdw blurRad="12700" dist="38100" dir="2700000" algn="tl" rotWithShape="0">
+                    <a:schemeClr val="bg1">
+                      <a:lumMod val="50000"/>
+                    </a:schemeClr>
+                  </a:outerShdw>
+                </a:effectLst>
+                <a:latin typeface="Fira Code" pitchFamily="49" charset="0"/>
+                <a:ea typeface="Fira Code" pitchFamily="49" charset="0"/>
+                <a:cs typeface="Fira Code" pitchFamily="49" charset="0"/>
+              </a:rPr>
+              <a:t>Kuka minä olen?</a:t>
             </a:r>
           </a:p>
         </p:txBody>
@@ -4616,16 +5273,297 @@
           <a:lstStyle/>
           <a:p>
             <a:r>
-              <a:rPr lang="en-FI" dirty="0"/>
-              <a:t>Tähän lyhyt selostus niiden eroista</a:t>
-            </a:r>
-          </a:p>
-        </p:txBody>
-      </p:sp>
+              <a:rPr lang="en-FI" dirty="0">
+                <a:effectLst>
+                  <a:outerShdw blurRad="50800" dist="38100" dir="2700000" algn="tl" rotWithShape="0">
+                    <a:prstClr val="black">
+                      <a:alpha val="40000"/>
+                    </a:prstClr>
+                  </a:outerShdw>
+                </a:effectLst>
+                <a:latin typeface="Source Sans Pro" panose="020B0503030403020204" pitchFamily="34" charset="0"/>
+                <a:ea typeface="Source Sans Pro" panose="020B0503030403020204" pitchFamily="34" charset="0"/>
+              </a:rPr>
+              <a:t>DNA:lla töissä frontend-devaajana</a:t>
+            </a:r>
+          </a:p>
+          <a:p>
+            <a:r>
+              <a:rPr lang="en-FI" dirty="0">
+                <a:effectLst>
+                  <a:outerShdw blurRad="50800" dist="38100" dir="2700000" algn="tl" rotWithShape="0">
+                    <a:prstClr val="black">
+                      <a:alpha val="40000"/>
+                    </a:prstClr>
+                  </a:outerShdw>
+                </a:effectLst>
+                <a:latin typeface="Source Sans Pro" panose="020B0503030403020204" pitchFamily="34" charset="0"/>
+                <a:ea typeface="Source Sans Pro" panose="020B0503030403020204" pitchFamily="34" charset="0"/>
+              </a:rPr>
+              <a:t>Tehnyt webbi-kehitystä vuodesta 2017</a:t>
+            </a:r>
+            <a:br>
+              <a:rPr lang="en-FI" dirty="0">
+                <a:effectLst>
+                  <a:outerShdw blurRad="50800" dist="38100" dir="2700000" algn="tl" rotWithShape="0">
+                    <a:prstClr val="black">
+                      <a:alpha val="40000"/>
+                    </a:prstClr>
+                  </a:outerShdw>
+                </a:effectLst>
+                <a:latin typeface="Source Sans Pro" panose="020B0503030403020204" pitchFamily="34" charset="0"/>
+                <a:ea typeface="Source Sans Pro" panose="020B0503030403020204" pitchFamily="34" charset="0"/>
+              </a:rPr>
+            </a:br>
+            <a:r>
+              <a:rPr lang="en-FI" dirty="0">
+                <a:effectLst>
+                  <a:outerShdw blurRad="50800" dist="38100" dir="2700000" algn="tl" rotWithShape="0">
+                    <a:prstClr val="black">
+                      <a:alpha val="40000"/>
+                    </a:prstClr>
+                  </a:outerShdw>
+                </a:effectLst>
+                <a:latin typeface="Source Sans Pro" panose="020B0503030403020204" pitchFamily="34" charset="0"/>
+                <a:ea typeface="Source Sans Pro" panose="020B0503030403020204" pitchFamily="34" charset="0"/>
+              </a:rPr>
+              <a:t>ammatikseni</a:t>
+            </a:r>
+          </a:p>
+          <a:p>
+            <a:r>
+              <a:rPr lang="en-FI" dirty="0">
+                <a:effectLst>
+                  <a:outerShdw blurRad="50800" dist="38100" dir="2700000" algn="tl" rotWithShape="0">
+                    <a:prstClr val="black">
+                      <a:alpha val="40000"/>
+                    </a:prstClr>
+                  </a:outerShdw>
+                </a:effectLst>
+                <a:latin typeface="Source Sans Pro" panose="020B0503030403020204" pitchFamily="34" charset="0"/>
+                <a:ea typeface="Source Sans Pro" panose="020B0503030403020204" pitchFamily="34" charset="0"/>
+              </a:rPr>
+              <a:t>TypeScript, React, CSS</a:t>
+            </a:r>
+          </a:p>
+          <a:p>
+            <a:endParaRPr lang="en-FI" dirty="0"/>
+          </a:p>
+        </p:txBody>
+      </p:sp>
+      <p:pic>
+        <p:nvPicPr>
+          <p:cNvPr id="5" name="Picture 4" descr="A person wearing glasses and a black jacket&#10;&#10;Description automatically generated">
+            <a:extLst>
+              <a:ext uri="{FF2B5EF4-FFF2-40B4-BE49-F238E27FC236}">
+                <a16:creationId xmlns:a16="http://schemas.microsoft.com/office/drawing/2014/main" id="{362F6710-7401-9B8D-4519-861065852871}"/>
+              </a:ext>
+            </a:extLst>
+          </p:cNvPr>
+          <p:cNvPicPr>
+            <a:picLocks noChangeAspect="1"/>
+          </p:cNvPicPr>
+          <p:nvPr/>
+        </p:nvPicPr>
+        <p:blipFill rotWithShape="1">
+          <a:blip r:embed="rId2"/>
+          <a:srcRect l="16448" r="14382"/>
+          <a:stretch/>
+        </p:blipFill>
+        <p:spPr>
+          <a:xfrm>
+            <a:off x="6475013" y="3601761"/>
+            <a:ext cx="2143889" cy="2324588"/>
+          </a:xfrm>
+          <a:prstGeom prst="ellipse">
+            <a:avLst/>
+          </a:prstGeom>
+          <a:ln>
+            <a:noFill/>
+          </a:ln>
+          <a:effectLst>
+            <a:softEdge rad="112500"/>
+          </a:effectLst>
+        </p:spPr>
+      </p:pic>
+      <p:pic>
+        <p:nvPicPr>
+          <p:cNvPr id="7" name="Picture 6" descr="A pink background with black letters&#10;&#10;Description automatically generated">
+            <a:extLst>
+              <a:ext uri="{FF2B5EF4-FFF2-40B4-BE49-F238E27FC236}">
+                <a16:creationId xmlns:a16="http://schemas.microsoft.com/office/drawing/2014/main" id="{45DD0835-FD6F-CD1F-F4EC-DF747F5DF86D}"/>
+              </a:ext>
+            </a:extLst>
+          </p:cNvPr>
+          <p:cNvPicPr>
+            <a:picLocks noChangeAspect="1"/>
+          </p:cNvPicPr>
+          <p:nvPr/>
+        </p:nvPicPr>
+        <p:blipFill>
+          <a:blip r:embed="rId3"/>
+          <a:stretch>
+            <a:fillRect/>
+          </a:stretch>
+        </p:blipFill>
+        <p:spPr>
+          <a:xfrm>
+            <a:off x="9408287" y="3794537"/>
+            <a:ext cx="2131812" cy="2131812"/>
+          </a:xfrm>
+          <a:prstGeom prst="rect">
+            <a:avLst/>
+          </a:prstGeom>
+        </p:spPr>
+      </p:pic>
     </p:spTree>
     <p:extLst>
       <p:ext uri="{BB962C8B-B14F-4D97-AF65-F5344CB8AC3E}">
-        <p14:creationId xmlns:p14="http://schemas.microsoft.com/office/powerpoint/2010/main" val="2583726931"/>
+        <p14:creationId xmlns:p14="http://schemas.microsoft.com/office/powerpoint/2010/main" val="919774687"/>
+      </p:ext>
+    </p:extLst>
+  </p:cSld>
+  <p:clrMapOvr>
+    <a:masterClrMapping/>
+  </p:clrMapOvr>
+</p:sld>
+</file>
+
+<file path=ppt/slides/slide4.xml><?xml version="1.0" encoding="utf-8"?>
+<p:sld xmlns:a="http://schemas.openxmlformats.org/drawingml/2006/main" xmlns:r="http://schemas.openxmlformats.org/officeDocument/2006/relationships" xmlns:p="http://schemas.openxmlformats.org/presentationml/2006/main">
+  <p:cSld>
+    <p:bg>
+      <p:bgPr>
+        <a:gradFill>
+          <a:gsLst>
+            <a:gs pos="7000">
+              <a:srgbClr val="FFD7A5"/>
+            </a:gs>
+            <a:gs pos="0">
+              <a:srgbClr val="FFAEAD"/>
+            </a:gs>
+            <a:gs pos="15000">
+              <a:srgbClr val="FDFFB6"/>
+            </a:gs>
+            <a:gs pos="24000">
+              <a:srgbClr val="CBFFC0"/>
+            </a:gs>
+            <a:gs pos="78000">
+              <a:schemeClr val="bg1">
+                <a:lumMod val="95000"/>
+              </a:schemeClr>
+            </a:gs>
+            <a:gs pos="30000">
+              <a:srgbClr val="9BF7FF"/>
+            </a:gs>
+          </a:gsLst>
+          <a:path path="circle">
+            <a:fillToRect l="100000" t="100000"/>
+          </a:path>
+        </a:gradFill>
+        <a:effectLst/>
+      </p:bgPr>
+    </p:bg>
+    <p:spTree>
+      <p:nvGrpSpPr>
+        <p:cNvPr id="1" name=""/>
+        <p:cNvGrpSpPr/>
+        <p:nvPr/>
+      </p:nvGrpSpPr>
+      <p:grpSpPr>
+        <a:xfrm>
+          <a:off x="0" y="0"/>
+          <a:ext cx="0" cy="0"/>
+          <a:chOff x="0" y="0"/>
+          <a:chExt cx="0" cy="0"/>
+        </a:xfrm>
+      </p:grpSpPr>
+      <p:sp>
+        <p:nvSpPr>
+          <p:cNvPr id="2" name="Title 1">
+            <a:extLst>
+              <a:ext uri="{FF2B5EF4-FFF2-40B4-BE49-F238E27FC236}">
+                <a16:creationId xmlns:a16="http://schemas.microsoft.com/office/drawing/2014/main" id="{3A694B04-800D-90AF-F9C5-BA2682774786}"/>
+              </a:ext>
+            </a:extLst>
+          </p:cNvPr>
+          <p:cNvSpPr>
+            <a:spLocks noGrp="1"/>
+          </p:cNvSpPr>
+          <p:nvPr>
+            <p:ph type="title"/>
+          </p:nvPr>
+        </p:nvSpPr>
+        <p:spPr>
+          <a:xfrm>
+            <a:off x="950742" y="1701555"/>
+            <a:ext cx="10515600" cy="1325563"/>
+          </a:xfrm>
+        </p:spPr>
+        <p:txBody>
+          <a:bodyPr>
+            <a:normAutofit/>
+          </a:bodyPr>
+          <a:lstStyle/>
+          <a:p>
+            <a:r>
+              <a:rPr lang="en-FI" sz="7200" b="1" dirty="0">
+                <a:ln w="9525">
+                  <a:solidFill>
+                    <a:schemeClr val="bg1"/>
+                  </a:solidFill>
+                  <a:prstDash val="solid"/>
+                </a:ln>
+                <a:effectLst>
+                  <a:outerShdw blurRad="12700" dist="38100" dir="2700000" algn="tl" rotWithShape="0">
+                    <a:schemeClr val="bg1">
+                      <a:lumMod val="50000"/>
+                    </a:schemeClr>
+                  </a:outerShdw>
+                </a:effectLst>
+                <a:latin typeface="Fira Code" pitchFamily="49" charset="0"/>
+                <a:ea typeface="Fira Code" pitchFamily="49" charset="0"/>
+                <a:cs typeface="Fira Code" pitchFamily="49" charset="0"/>
+              </a:rPr>
+              <a:t>Aloitetaan!</a:t>
+            </a:r>
+          </a:p>
+        </p:txBody>
+      </p:sp>
+      <p:pic>
+        <p:nvPicPr>
+          <p:cNvPr id="6" name="Picture 5">
+            <a:extLst>
+              <a:ext uri="{FF2B5EF4-FFF2-40B4-BE49-F238E27FC236}">
+                <a16:creationId xmlns:a16="http://schemas.microsoft.com/office/drawing/2014/main" id="{7B40D492-88F2-5E7F-2713-F9B58B9AF53C}"/>
+              </a:ext>
+            </a:extLst>
+          </p:cNvPr>
+          <p:cNvPicPr>
+            <a:picLocks noChangeAspect="1"/>
+          </p:cNvPicPr>
+          <p:nvPr/>
+        </p:nvPicPr>
+        <p:blipFill>
+          <a:blip r:embed="rId2"/>
+          <a:stretch>
+            <a:fillRect/>
+          </a:stretch>
+        </p:blipFill>
+        <p:spPr>
+          <a:xfrm>
+            <a:off x="8653975" y="3319975"/>
+            <a:ext cx="3538025" cy="3538025"/>
+          </a:xfrm>
+          <a:prstGeom prst="rect">
+            <a:avLst/>
+          </a:prstGeom>
+        </p:spPr>
+      </p:pic>
+    </p:spTree>
+    <p:extLst>
+      <p:ext uri="{BB962C8B-B14F-4D97-AF65-F5344CB8AC3E}">
+        <p14:creationId xmlns:p14="http://schemas.microsoft.com/office/powerpoint/2010/main" val="3533597011"/>
       </p:ext>
     </p:extLst>
   </p:cSld>
@@ -4675,7 +5613,7 @@
           <a:p>
             <a:r>
               <a:rPr lang="en-FI" dirty="0"/>
-              <a:t>Full stack</a:t>
+              <a:t>Sisältö</a:t>
             </a:r>
           </a:p>
         </p:txBody>
@@ -4701,17 +5639,14 @@
           <a:bodyPr/>
           <a:lstStyle/>
           <a:p>
-            <a:r>
-              <a:rPr lang="en-FI" dirty="0"/>
-              <a:t>Kaikille, jotka ovat kiinnostuneita saamaan konkreettisia työkaluja ensimmäisen junior frontend-devaajan työpaikkaa varten.</a:t>
-            </a:r>
+            <a:endParaRPr lang="en-FI" dirty="0"/>
           </a:p>
         </p:txBody>
       </p:sp>
     </p:spTree>
     <p:extLst>
       <p:ext uri="{BB962C8B-B14F-4D97-AF65-F5344CB8AC3E}">
-        <p14:creationId xmlns:p14="http://schemas.microsoft.com/office/powerpoint/2010/main" val="2549445756"/>
+        <p14:creationId xmlns:p14="http://schemas.microsoft.com/office/powerpoint/2010/main" val="3232460203"/>
       </p:ext>
     </p:extLst>
   </p:cSld>
@@ -4761,7 +5696,7 @@
           <a:p>
             <a:r>
               <a:rPr lang="en-FI" dirty="0"/>
-              <a:t>Sisältö</a:t>
+              <a:t>Frontend, backend?</a:t>
             </a:r>
           </a:p>
         </p:txBody>
@@ -4787,14 +5722,17 @@
           <a:bodyPr/>
           <a:lstStyle/>
           <a:p>
-            <a:endParaRPr lang="en-FI" dirty="0"/>
+            <a:r>
+              <a:rPr lang="en-FI" dirty="0"/>
+              <a:t>Tähän lyhyt selostus niiden eroista</a:t>
+            </a:r>
           </a:p>
         </p:txBody>
       </p:sp>
     </p:spTree>
     <p:extLst>
       <p:ext uri="{BB962C8B-B14F-4D97-AF65-F5344CB8AC3E}">
-        <p14:creationId xmlns:p14="http://schemas.microsoft.com/office/powerpoint/2010/main" val="3232460203"/>
+        <p14:creationId xmlns:p14="http://schemas.microsoft.com/office/powerpoint/2010/main" val="2583726931"/>
       </p:ext>
     </p:extLst>
   </p:cSld>
@@ -4826,7 +5764,7 @@
           <p:cNvPr id="2" name="Title 1">
             <a:extLst>
               <a:ext uri="{FF2B5EF4-FFF2-40B4-BE49-F238E27FC236}">
-                <a16:creationId xmlns:a16="http://schemas.microsoft.com/office/drawing/2014/main" id="{20B5B526-0EB2-FA05-09CC-3F796D46E9EA}"/>
+                <a16:creationId xmlns:a16="http://schemas.microsoft.com/office/drawing/2014/main" id="{3A694B04-800D-90AF-F9C5-BA2682774786}"/>
               </a:ext>
             </a:extLst>
           </p:cNvPr>
@@ -4844,7 +5782,7 @@
           <a:p>
             <a:r>
               <a:rPr lang="en-FI" dirty="0"/>
-              <a:t>Motivaatio</a:t>
+              <a:t>Full stack</a:t>
             </a:r>
           </a:p>
         </p:txBody>
@@ -4854,7 +5792,7 @@
           <p:cNvPr id="3" name="Content Placeholder 2">
             <a:extLst>
               <a:ext uri="{FF2B5EF4-FFF2-40B4-BE49-F238E27FC236}">
-                <a16:creationId xmlns:a16="http://schemas.microsoft.com/office/drawing/2014/main" id="{034194A4-F636-FDAC-F3E8-140BF54574FC}"/>
+                <a16:creationId xmlns:a16="http://schemas.microsoft.com/office/drawing/2014/main" id="{B1AA3757-FFFA-98A4-3AC9-A249A9058FA9}"/>
               </a:ext>
             </a:extLst>
           </p:cNvPr>
@@ -4870,14 +5808,17 @@
           <a:bodyPr/>
           <a:lstStyle/>
           <a:p>
-            <a:endParaRPr lang="en-FI"/>
+            <a:r>
+              <a:rPr lang="en-FI" dirty="0"/>
+              <a:t>Kaikille, jotka ovat kiinnostuneita saamaan konkreettisia työkaluja ensimmäisen junior frontend-devaajan työpaikkaa varten.</a:t>
+            </a:r>
           </a:p>
         </p:txBody>
       </p:sp>
     </p:spTree>
     <p:extLst>
       <p:ext uri="{BB962C8B-B14F-4D97-AF65-F5344CB8AC3E}">
-        <p14:creationId xmlns:p14="http://schemas.microsoft.com/office/powerpoint/2010/main" val="3112751845"/>
+        <p14:creationId xmlns:p14="http://schemas.microsoft.com/office/powerpoint/2010/main" val="2549445756"/>
       </p:ext>
     </p:extLst>
   </p:cSld>
@@ -4927,164 +5868,40 @@
           <a:p>
             <a:r>
               <a:rPr lang="en-FI" dirty="0"/>
-              <a:t>Fronttiteknologioita on niin paljon…</a:t>
-            </a:r>
-          </a:p>
-        </p:txBody>
-      </p:sp>
-      <p:pic>
-        <p:nvPicPr>
-          <p:cNvPr id="9" name="Content Placeholder 8" descr="A blue and black symbol&#10;&#10;Description automatically generated">
-            <a:extLst>
-              <a:ext uri="{FF2B5EF4-FFF2-40B4-BE49-F238E27FC236}">
-                <a16:creationId xmlns:a16="http://schemas.microsoft.com/office/drawing/2014/main" id="{F54F5112-52DA-703C-091F-9E45D6164ACD}"/>
-              </a:ext>
-            </a:extLst>
-          </p:cNvPr>
-          <p:cNvPicPr>
-            <a:picLocks noGrp="1" noChangeAspect="1"/>
-          </p:cNvPicPr>
+              <a:t>Motivaatio</a:t>
+            </a:r>
+          </a:p>
+        </p:txBody>
+      </p:sp>
+      <p:sp>
+        <p:nvSpPr>
+          <p:cNvPr id="3" name="Content Placeholder 2">
+            <a:extLst>
+              <a:ext uri="{FF2B5EF4-FFF2-40B4-BE49-F238E27FC236}">
+                <a16:creationId xmlns:a16="http://schemas.microsoft.com/office/drawing/2014/main" id="{034194A4-F636-FDAC-F3E8-140BF54574FC}"/>
+              </a:ext>
+            </a:extLst>
+          </p:cNvPr>
+          <p:cNvSpPr>
+            <a:spLocks noGrp="1"/>
+          </p:cNvSpPr>
           <p:nvPr>
             <p:ph idx="1"/>
           </p:nvPr>
-        </p:nvPicPr>
-        <p:blipFill>
-          <a:blip r:embed="rId2"/>
-          <a:stretch>
-            <a:fillRect/>
-          </a:stretch>
-        </p:blipFill>
-        <p:spPr>
-          <a:xfrm>
-            <a:off x="975062" y="1690688"/>
-            <a:ext cx="2158740" cy="1953660"/>
-          </a:xfrm>
-        </p:spPr>
-      </p:pic>
-      <p:pic>
-        <p:nvPicPr>
-          <p:cNvPr id="11" name="Picture 10" descr="A green and blue letter v&#10;&#10;Description automatically generated">
-            <a:extLst>
-              <a:ext uri="{FF2B5EF4-FFF2-40B4-BE49-F238E27FC236}">
-                <a16:creationId xmlns:a16="http://schemas.microsoft.com/office/drawing/2014/main" id="{8D1CEF0D-CCFA-7567-233A-F4E7CDC878BC}"/>
-              </a:ext>
-            </a:extLst>
-          </p:cNvPr>
-          <p:cNvPicPr>
-            <a:picLocks noChangeAspect="1"/>
-          </p:cNvPicPr>
-          <p:nvPr/>
-        </p:nvPicPr>
-        <p:blipFill>
-          <a:blip r:embed="rId3"/>
-          <a:stretch>
-            <a:fillRect/>
-          </a:stretch>
-        </p:blipFill>
-        <p:spPr>
-          <a:xfrm>
-            <a:off x="3964609" y="1675020"/>
-            <a:ext cx="2163279" cy="2163279"/>
-          </a:xfrm>
-          <a:prstGeom prst="rect">
-            <a:avLst/>
-          </a:prstGeom>
-        </p:spPr>
-      </p:pic>
-      <p:pic>
-        <p:nvPicPr>
-          <p:cNvPr id="12" name="Picture 11">
-            <a:extLst>
-              <a:ext uri="{FF2B5EF4-FFF2-40B4-BE49-F238E27FC236}">
-                <a16:creationId xmlns:a16="http://schemas.microsoft.com/office/drawing/2014/main" id="{FF3A8072-9A81-B91C-6E2B-CD483E30FCD6}"/>
-              </a:ext>
-            </a:extLst>
-          </p:cNvPr>
-          <p:cNvPicPr>
-            <a:picLocks noChangeAspect="1"/>
-          </p:cNvPicPr>
-          <p:nvPr/>
-        </p:nvPicPr>
-        <p:blipFill>
-          <a:blip r:embed="rId4"/>
-          <a:stretch>
-            <a:fillRect/>
-          </a:stretch>
-        </p:blipFill>
-        <p:spPr>
-          <a:xfrm>
-            <a:off x="6958695" y="2018367"/>
-            <a:ext cx="3445361" cy="1476583"/>
-          </a:xfrm>
-          <a:prstGeom prst="rect">
-            <a:avLst/>
-          </a:prstGeom>
-        </p:spPr>
-      </p:pic>
-      <p:pic>
-        <p:nvPicPr>
-          <p:cNvPr id="14" name="Picture 13" descr="A red and white logo&#10;&#10;Description automatically generated">
-            <a:extLst>
-              <a:ext uri="{FF2B5EF4-FFF2-40B4-BE49-F238E27FC236}">
-                <a16:creationId xmlns:a16="http://schemas.microsoft.com/office/drawing/2014/main" id="{96D2E224-883A-6E73-D152-B9B8B979EBAD}"/>
-              </a:ext>
-            </a:extLst>
-          </p:cNvPr>
-          <p:cNvPicPr>
-            <a:picLocks noChangeAspect="1"/>
-          </p:cNvPicPr>
-          <p:nvPr/>
-        </p:nvPicPr>
-        <p:blipFill>
-          <a:blip r:embed="rId5"/>
-          <a:stretch>
-            <a:fillRect/>
-          </a:stretch>
-        </p:blipFill>
-        <p:spPr>
-          <a:xfrm>
-            <a:off x="531191" y="3853967"/>
-            <a:ext cx="2697372" cy="2697372"/>
-          </a:xfrm>
-          <a:prstGeom prst="rect">
-            <a:avLst/>
-          </a:prstGeom>
-        </p:spPr>
-      </p:pic>
-      <p:pic>
-        <p:nvPicPr>
-          <p:cNvPr id="16" name="Picture 15" descr="A yellow and black logo&#10;&#10;Description automatically generated">
-            <a:extLst>
-              <a:ext uri="{FF2B5EF4-FFF2-40B4-BE49-F238E27FC236}">
-                <a16:creationId xmlns:a16="http://schemas.microsoft.com/office/drawing/2014/main" id="{FD486AF8-10E8-E302-960E-7D128FFB983A}"/>
-              </a:ext>
-            </a:extLst>
-          </p:cNvPr>
-          <p:cNvPicPr>
-            <a:picLocks noChangeAspect="1"/>
-          </p:cNvPicPr>
-          <p:nvPr/>
-        </p:nvPicPr>
-        <p:blipFill>
-          <a:blip r:embed="rId6"/>
-          <a:stretch>
-            <a:fillRect/>
-          </a:stretch>
-        </p:blipFill>
-        <p:spPr>
-          <a:xfrm>
-            <a:off x="3964609" y="4183063"/>
-            <a:ext cx="2039179" cy="2039179"/>
-          </a:xfrm>
-          <a:prstGeom prst="rect">
-            <a:avLst/>
-          </a:prstGeom>
-        </p:spPr>
-      </p:pic>
+        </p:nvSpPr>
+        <p:spPr/>
+        <p:txBody>
+          <a:bodyPr/>
+          <a:lstStyle/>
+          <a:p>
+            <a:endParaRPr lang="en-FI"/>
+          </a:p>
+        </p:txBody>
+      </p:sp>
     </p:spTree>
     <p:extLst>
       <p:ext uri="{BB962C8B-B14F-4D97-AF65-F5344CB8AC3E}">
-        <p14:creationId xmlns:p14="http://schemas.microsoft.com/office/powerpoint/2010/main" val="2137470921"/>
+        <p14:creationId xmlns:p14="http://schemas.microsoft.com/office/powerpoint/2010/main" val="3112751845"/>
       </p:ext>
     </p:extLst>
   </p:cSld>
@@ -5116,7 +5933,7 @@
           <p:cNvPr id="2" name="Title 1">
             <a:extLst>
               <a:ext uri="{FF2B5EF4-FFF2-40B4-BE49-F238E27FC236}">
-                <a16:creationId xmlns:a16="http://schemas.microsoft.com/office/drawing/2014/main" id="{F101F404-C1E5-9324-2496-125A7F944312}"/>
+                <a16:creationId xmlns:a16="http://schemas.microsoft.com/office/drawing/2014/main" id="{20B5B526-0EB2-FA05-09CC-3F796D46E9EA}"/>
               </a:ext>
             </a:extLst>
           </p:cNvPr>
@@ -5134,43 +5951,164 @@
           <a:p>
             <a:r>
               <a:rPr lang="en-FI" dirty="0"/>
-              <a:t>Miten päästä alkuun?</a:t>
-            </a:r>
-          </a:p>
-        </p:txBody>
-      </p:sp>
-      <p:sp>
-        <p:nvSpPr>
-          <p:cNvPr id="3" name="Content Placeholder 2">
-            <a:extLst>
-              <a:ext uri="{FF2B5EF4-FFF2-40B4-BE49-F238E27FC236}">
-                <a16:creationId xmlns:a16="http://schemas.microsoft.com/office/drawing/2014/main" id="{1AFC09FA-74AD-CF75-26D6-5841407E8C3F}"/>
-              </a:ext>
-            </a:extLst>
-          </p:cNvPr>
-          <p:cNvSpPr>
-            <a:spLocks noGrp="1"/>
-          </p:cNvSpPr>
+              <a:t>Fronttiteknologioita on niin paljon…</a:t>
+            </a:r>
+          </a:p>
+        </p:txBody>
+      </p:sp>
+      <p:pic>
+        <p:nvPicPr>
+          <p:cNvPr id="9" name="Content Placeholder 8" descr="A blue and black symbol&#10;&#10;Description automatically generated">
+            <a:extLst>
+              <a:ext uri="{FF2B5EF4-FFF2-40B4-BE49-F238E27FC236}">
+                <a16:creationId xmlns:a16="http://schemas.microsoft.com/office/drawing/2014/main" id="{F54F5112-52DA-703C-091F-9E45D6164ACD}"/>
+              </a:ext>
+            </a:extLst>
+          </p:cNvPr>
+          <p:cNvPicPr>
+            <a:picLocks noGrp="1" noChangeAspect="1"/>
+          </p:cNvPicPr>
           <p:nvPr>
             <p:ph idx="1"/>
           </p:nvPr>
-        </p:nvSpPr>
-        <p:spPr/>
-        <p:txBody>
-          <a:bodyPr/>
-          <a:lstStyle/>
-          <a:p>
-            <a:r>
-              <a:rPr lang="en-FI" dirty="0"/>
-              <a:t>Tässä lista konkreettisista minimiasioista, jotka tarvitset alkuun pääsemiseen. Ei huolta, niistä kaikki ovat ilmaisia!</a:t>
-            </a:r>
-          </a:p>
-        </p:txBody>
-      </p:sp>
+        </p:nvPicPr>
+        <p:blipFill>
+          <a:blip r:embed="rId2"/>
+          <a:stretch>
+            <a:fillRect/>
+          </a:stretch>
+        </p:blipFill>
+        <p:spPr>
+          <a:xfrm>
+            <a:off x="975062" y="1690688"/>
+            <a:ext cx="2158740" cy="1953660"/>
+          </a:xfrm>
+        </p:spPr>
+      </p:pic>
+      <p:pic>
+        <p:nvPicPr>
+          <p:cNvPr id="11" name="Picture 10" descr="A green and blue letter v&#10;&#10;Description automatically generated">
+            <a:extLst>
+              <a:ext uri="{FF2B5EF4-FFF2-40B4-BE49-F238E27FC236}">
+                <a16:creationId xmlns:a16="http://schemas.microsoft.com/office/drawing/2014/main" id="{8D1CEF0D-CCFA-7567-233A-F4E7CDC878BC}"/>
+              </a:ext>
+            </a:extLst>
+          </p:cNvPr>
+          <p:cNvPicPr>
+            <a:picLocks noChangeAspect="1"/>
+          </p:cNvPicPr>
+          <p:nvPr/>
+        </p:nvPicPr>
+        <p:blipFill>
+          <a:blip r:embed="rId3"/>
+          <a:stretch>
+            <a:fillRect/>
+          </a:stretch>
+        </p:blipFill>
+        <p:spPr>
+          <a:xfrm>
+            <a:off x="3964609" y="1675020"/>
+            <a:ext cx="2163279" cy="2163279"/>
+          </a:xfrm>
+          <a:prstGeom prst="rect">
+            <a:avLst/>
+          </a:prstGeom>
+        </p:spPr>
+      </p:pic>
+      <p:pic>
+        <p:nvPicPr>
+          <p:cNvPr id="12" name="Picture 11">
+            <a:extLst>
+              <a:ext uri="{FF2B5EF4-FFF2-40B4-BE49-F238E27FC236}">
+                <a16:creationId xmlns:a16="http://schemas.microsoft.com/office/drawing/2014/main" id="{FF3A8072-9A81-B91C-6E2B-CD483E30FCD6}"/>
+              </a:ext>
+            </a:extLst>
+          </p:cNvPr>
+          <p:cNvPicPr>
+            <a:picLocks noChangeAspect="1"/>
+          </p:cNvPicPr>
+          <p:nvPr/>
+        </p:nvPicPr>
+        <p:blipFill>
+          <a:blip r:embed="rId4"/>
+          <a:stretch>
+            <a:fillRect/>
+          </a:stretch>
+        </p:blipFill>
+        <p:spPr>
+          <a:xfrm>
+            <a:off x="6958695" y="2018367"/>
+            <a:ext cx="3445361" cy="1476583"/>
+          </a:xfrm>
+          <a:prstGeom prst="rect">
+            <a:avLst/>
+          </a:prstGeom>
+        </p:spPr>
+      </p:pic>
+      <p:pic>
+        <p:nvPicPr>
+          <p:cNvPr id="14" name="Picture 13" descr="A red and white logo&#10;&#10;Description automatically generated">
+            <a:extLst>
+              <a:ext uri="{FF2B5EF4-FFF2-40B4-BE49-F238E27FC236}">
+                <a16:creationId xmlns:a16="http://schemas.microsoft.com/office/drawing/2014/main" id="{96D2E224-883A-6E73-D152-B9B8B979EBAD}"/>
+              </a:ext>
+            </a:extLst>
+          </p:cNvPr>
+          <p:cNvPicPr>
+            <a:picLocks noChangeAspect="1"/>
+          </p:cNvPicPr>
+          <p:nvPr/>
+        </p:nvPicPr>
+        <p:blipFill>
+          <a:blip r:embed="rId5"/>
+          <a:stretch>
+            <a:fillRect/>
+          </a:stretch>
+        </p:blipFill>
+        <p:spPr>
+          <a:xfrm>
+            <a:off x="531191" y="3853967"/>
+            <a:ext cx="2697372" cy="2697372"/>
+          </a:xfrm>
+          <a:prstGeom prst="rect">
+            <a:avLst/>
+          </a:prstGeom>
+        </p:spPr>
+      </p:pic>
+      <p:pic>
+        <p:nvPicPr>
+          <p:cNvPr id="16" name="Picture 15" descr="A yellow and black logo&#10;&#10;Description automatically generated">
+            <a:extLst>
+              <a:ext uri="{FF2B5EF4-FFF2-40B4-BE49-F238E27FC236}">
+                <a16:creationId xmlns:a16="http://schemas.microsoft.com/office/drawing/2014/main" id="{FD486AF8-10E8-E302-960E-7D128FFB983A}"/>
+              </a:ext>
+            </a:extLst>
+          </p:cNvPr>
+          <p:cNvPicPr>
+            <a:picLocks noChangeAspect="1"/>
+          </p:cNvPicPr>
+          <p:nvPr/>
+        </p:nvPicPr>
+        <p:blipFill>
+          <a:blip r:embed="rId6"/>
+          <a:stretch>
+            <a:fillRect/>
+          </a:stretch>
+        </p:blipFill>
+        <p:spPr>
+          <a:xfrm>
+            <a:off x="3964609" y="4183063"/>
+            <a:ext cx="2039179" cy="2039179"/>
+          </a:xfrm>
+          <a:prstGeom prst="rect">
+            <a:avLst/>
+          </a:prstGeom>
+        </p:spPr>
+      </p:pic>
     </p:spTree>
     <p:extLst>
       <p:ext uri="{BB962C8B-B14F-4D97-AF65-F5344CB8AC3E}">
-        <p14:creationId xmlns:p14="http://schemas.microsoft.com/office/powerpoint/2010/main" val="2492267038"/>
+        <p14:creationId xmlns:p14="http://schemas.microsoft.com/office/powerpoint/2010/main" val="2137470921"/>
       </p:ext>
     </p:extLst>
   </p:cSld>
@@ -5473,4 +6411,22 @@
     </a:ext>
   </a:extLst>
 </a:theme>
+</file>
+
+<file path=ppt/webextensions/taskpanes.xml><?xml version="1.0" encoding="utf-8"?>
+<wetp:taskpanes xmlns:wetp="http://schemas.microsoft.com/office/webextensions/taskpanes/2010/11">
+  <wetp:taskpane dockstate="right" visibility="0" width="350" row="0">
+    <wetp:webextensionref xmlns:r="http://schemas.openxmlformats.org/officeDocument/2006/relationships" r:id="rId1"/>
+  </wetp:taskpane>
+</wetp:taskpanes>
+</file>
+
+<file path=ppt/webextensions/webextension1.xml><?xml version="1.0" encoding="utf-8"?>
+<we:webextension xmlns:we="http://schemas.microsoft.com/office/webextensions/webextension/2010/11" id="{C8606A23-AFE0-BF47-857B-E826FCEF7E84}">
+  <we:reference id="1bc88095-842c-4f95-b4d8-085627455efa" version="1.0.0.7" store="EXCatalog" storeType="EXCatalog"/>
+  <we:alternateReferences/>
+  <we:properties/>
+  <we:bindings/>
+  <we:snapshot xmlns:r="http://schemas.openxmlformats.org/officeDocument/2006/relationships"/>
+</we:webextension>
 </file>
</xml_diff>